<commit_message>
Finish 6th slide. Done for today.
</commit_message>
<xml_diff>
--- a/presentation/Scaling OpenSimulator Inventory using NoSQL.pptx
+++ b/presentation/Scaling OpenSimulator Inventory using NoSQL.pptx
@@ -109,6 +109,11 @@
       </a:defRPr>
     </a:lvl9pPr>
   </p:defaultTextStyle>
+  <p:extLst>
+    <p:ext uri="{EFAFB233-063F-42B5-8137-9DF3F51BA10A}">
+      <p15:sldGuideLst xmlns:p15="http://schemas.microsoft.com/office/powerpoint/2012/main"/>
+    </p:ext>
+  </p:extLst>
 </p:presentation>
 </file>
 
@@ -4728,6 +4733,51 @@
           <a:p>
             <a:pPr>
               <a:buFont typeface="Wingdings" panose="05000000000000000000" pitchFamily="2" charset="2"/>
+              <a:buChar char="§"/>
+            </a:pPr>
+            <a:r>
+              <a:rPr lang="en-US" dirty="0" smtClean="0"/>
+              <a:t>Your data is replicated onto multiple servers that can even span different datacenters</a:t>
+            </a:r>
+          </a:p>
+          <a:p>
+            <a:pPr>
+              <a:buFont typeface="Wingdings" panose="05000000000000000000" pitchFamily="2" charset="2"/>
+              <a:buChar char="§"/>
+            </a:pPr>
+            <a:r>
+              <a:rPr lang="en-US" dirty="0" smtClean="0"/>
+              <a:t>You can lose one or more </a:t>
+            </a:r>
+            <a:r>
+              <a:rPr lang="en-US" b="1" dirty="0" smtClean="0"/>
+              <a:t>servers</a:t>
+            </a:r>
+            <a:r>
+              <a:rPr lang="en-US" dirty="0" smtClean="0"/>
+              <a:t> in a cluster and still stay up and running with zero downtime and zero data loss. This goes well beyond simple RAID.</a:t>
+            </a:r>
+          </a:p>
+          <a:p>
+            <a:pPr>
+              <a:buFont typeface="Wingdings" panose="05000000000000000000" pitchFamily="2" charset="2"/>
+              <a:buChar char="§"/>
+            </a:pPr>
+            <a:r>
+              <a:rPr lang="en-US" dirty="0" smtClean="0"/>
+              <a:t>Seeing the load on backend increase beyond your comfort level? Simply add new servers to the cluster with ZERO downtime.</a:t>
+            </a:r>
+          </a:p>
+          <a:p>
+            <a:pPr>
+              <a:buFont typeface="Wingdings" panose="05000000000000000000" pitchFamily="2" charset="2"/>
+              <a:buChar char="§"/>
+            </a:pPr>
+            <a:endParaRPr lang="en-US" dirty="0" smtClean="0"/>
+          </a:p>
+          <a:p>
+            <a:pPr>
+              <a:buFont typeface="Wingdings" panose="05000000000000000000" pitchFamily="2" charset="2"/>
               <a:buChar char="q"/>
             </a:pPr>
             <a:endParaRPr lang="en-US" b="1" dirty="0" smtClean="0"/>

</xml_diff>

<commit_message>
Made more progress on the CQL schema and presentation.
</commit_message>
<xml_diff>
--- a/presentation/Scaling OpenSimulator Inventory using NoSQL.pptx
+++ b/presentation/Scaling OpenSimulator Inventory using NoSQL.pptx
@@ -12,6 +12,10 @@
     <p:sldId id="261" r:id="rId6"/>
     <p:sldId id="260" r:id="rId7"/>
     <p:sldId id="262" r:id="rId8"/>
+    <p:sldId id="263" r:id="rId9"/>
+    <p:sldId id="264" r:id="rId10"/>
+    <p:sldId id="265" r:id="rId11"/>
+    <p:sldId id="266" r:id="rId12"/>
   </p:sldIdLst>
   <p:sldSz cx="12192000" cy="6858000"/>
   <p:notesSz cx="6858000" cy="9144000"/>
@@ -344,7 +348,7 @@
           <a:p>
             <a:fld id="{4BDF68E2-58F2-4D09-BE8B-E3BD06533059}" type="datetimeFigureOut">
               <a:rPr lang="en-US" dirty="0"/>
-              <a:t>10/22/2014</a:t>
+              <a:t>10/23/2014</a:t>
             </a:fld>
             <a:endParaRPr lang="en-US" dirty="0"/>
           </a:p>
@@ -547,7 +551,7 @@
           <a:p>
             <a:fld id="{2E2D6473-DF6D-4702-B328-E0DD40540A4E}" type="datetimeFigureOut">
               <a:rPr lang="en-US" dirty="0"/>
-              <a:t>10/22/2014</a:t>
+              <a:t>10/23/2014</a:t>
             </a:fld>
             <a:endParaRPr lang="en-US" dirty="0"/>
           </a:p>
@@ -798,7 +802,7 @@
           <a:p>
             <a:fld id="{E26F7E3A-B166-407D-9866-32884E7D5B37}" type="datetimeFigureOut">
               <a:rPr lang="en-US" dirty="0"/>
-              <a:t>10/22/2014</a:t>
+              <a:t>10/23/2014</a:t>
             </a:fld>
             <a:endParaRPr lang="en-US" dirty="0"/>
           </a:p>
@@ -967,7 +971,7 @@
           <a:p>
             <a:fld id="{528FC5F6-F338-4AE4-BB23-26385BCFC423}" type="datetimeFigureOut">
               <a:rPr lang="en-US" dirty="0"/>
-              <a:t>10/22/2014</a:t>
+              <a:t>10/23/2014</a:t>
             </a:fld>
             <a:endParaRPr lang="en-US" dirty="0"/>
           </a:p>
@@ -1305,7 +1309,7 @@
           <a:p>
             <a:fld id="{20EBB0C4-6273-4C6E-B9BD-2EDC30F1CD52}" type="datetimeFigureOut">
               <a:rPr lang="en-US" dirty="0"/>
-              <a:t>10/22/2014</a:t>
+              <a:t>10/23/2014</a:t>
             </a:fld>
             <a:endParaRPr lang="en-US" dirty="0"/>
           </a:p>
@@ -1575,7 +1579,7 @@
           <a:p>
             <a:fld id="{19AB4D41-86C1-4908-B66A-0B50CEB3BF29}" type="datetimeFigureOut">
               <a:rPr lang="en-US" dirty="0"/>
-              <a:t>10/22/2014</a:t>
+              <a:t>10/23/2014</a:t>
             </a:fld>
             <a:endParaRPr lang="en-US" dirty="0"/>
           </a:p>
@@ -1949,7 +1953,7 @@
           <a:p>
             <a:fld id="{E6426E2C-56C1-4E0D-A793-0088A7FDD37E}" type="datetimeFigureOut">
               <a:rPr lang="en-US" dirty="0"/>
-              <a:t>10/22/2014</a:t>
+              <a:t>10/23/2014</a:t>
             </a:fld>
             <a:endParaRPr lang="en-US" dirty="0"/>
           </a:p>
@@ -2062,7 +2066,7 @@
           <a:p>
             <a:fld id="{C8C39B41-D8B5-4052-B551-9B5525EAA8B6}" type="datetimeFigureOut">
               <a:rPr lang="en-US" dirty="0"/>
-              <a:t>10/22/2014</a:t>
+              <a:t>10/23/2014</a:t>
             </a:fld>
             <a:endParaRPr lang="en-US" dirty="0"/>
           </a:p>
@@ -2228,7 +2232,7 @@
           <a:p>
             <a:fld id="{4D94136C-8742-45B2-AF27-D93DF72833A9}" type="datetimeFigureOut">
               <a:rPr lang="en-US" dirty="0"/>
-              <a:t>10/22/2014</a:t>
+              <a:t>10/23/2014</a:t>
             </a:fld>
             <a:endParaRPr lang="en-US" dirty="0"/>
           </a:p>
@@ -2578,7 +2582,7 @@
           <a:p>
             <a:fld id="{32ABBEA6-7C60-4B02-AE87-00D78D8422AF}" type="datetimeFigureOut">
               <a:rPr lang="en-US" dirty="0"/>
-              <a:t>10/22/2014</a:t>
+              <a:t>10/23/2014</a:t>
             </a:fld>
             <a:endParaRPr lang="en-US" dirty="0"/>
           </a:p>
@@ -2956,7 +2960,7 @@
           <a:p>
             <a:fld id="{C9CAD897-D46E-4AD2-BD9B-49DD3E640873}" type="datetimeFigureOut">
               <a:rPr lang="en-US" dirty="0"/>
-              <a:t>10/22/2014</a:t>
+              <a:t>10/23/2014</a:t>
             </a:fld>
             <a:endParaRPr lang="en-US" dirty="0"/>
           </a:p>
@@ -3238,7 +3242,7 @@
           <a:p>
             <a:fld id="{98624D31-43A5-475A-80CF-332C9F6DCF35}" type="datetimeFigureOut">
               <a:rPr lang="en-US" dirty="0"/>
-              <a:t>10/22/2014</a:t>
+              <a:t>10/23/2014</a:t>
             </a:fld>
             <a:endParaRPr lang="en-US" dirty="0"/>
           </a:p>
@@ -3867,6 +3871,58 @@
           </a:extLst>
         </p:spPr>
       </p:pic>
+      <p:sp>
+        <p:nvSpPr>
+          <p:cNvPr id="4" name="TextBox 3"/>
+          <p:cNvSpPr txBox="1"/>
+          <p:nvPr/>
+        </p:nvSpPr>
+        <p:spPr>
+          <a:xfrm>
+            <a:off x="6819941" y="4325112"/>
+            <a:ext cx="4390882" cy="369332"/>
+          </a:xfrm>
+          <a:prstGeom prst="rect">
+            <a:avLst/>
+          </a:prstGeom>
+          <a:noFill/>
+        </p:spPr>
+        <p:txBody>
+          <a:bodyPr wrap="none" rtlCol="0">
+            <a:spAutoFit/>
+          </a:bodyPr>
+          <a:lstStyle/>
+          <a:p>
+            <a:r>
+              <a:rPr lang="en-US" dirty="0" err="1" smtClean="0">
+                <a:solidFill>
+                  <a:schemeClr val="bg2">
+                    <a:lumMod val="75000"/>
+                  </a:schemeClr>
+                </a:solidFill>
+              </a:rPr>
+              <a:t>OpenSimulator</a:t>
+            </a:r>
+            <a:r>
+              <a:rPr lang="en-US" dirty="0" smtClean="0">
+                <a:solidFill>
+                  <a:schemeClr val="bg2">
+                    <a:lumMod val="75000"/>
+                  </a:schemeClr>
+                </a:solidFill>
+              </a:rPr>
+              <a:t> Community Conference 2014</a:t>
+            </a:r>
+            <a:endParaRPr lang="en-US" dirty="0">
+              <a:solidFill>
+                <a:schemeClr val="bg2">
+                  <a:lumMod val="75000"/>
+                </a:schemeClr>
+              </a:solidFill>
+            </a:endParaRPr>
+          </a:p>
+        </p:txBody>
+      </p:sp>
     </p:spTree>
     <p:extLst>
       <p:ext uri="{BB962C8B-B14F-4D97-AF65-F5344CB8AC3E}">
@@ -3877,6 +3933,433 @@
   <p:clrMapOvr>
     <a:masterClrMapping/>
   </p:clrMapOvr>
+</p:sld>
+</file>
+
+<file path=ppt/slides/slide10.xml><?xml version="1.0" encoding="utf-8"?>
+<p:sld xmlns:a="http://schemas.openxmlformats.org/drawingml/2006/main" xmlns:r="http://schemas.openxmlformats.org/officeDocument/2006/relationships" xmlns:p="http://schemas.openxmlformats.org/presentationml/2006/main">
+  <p:cSld>
+    <p:spTree>
+      <p:nvGrpSpPr>
+        <p:cNvPr id="1" name=""/>
+        <p:cNvGrpSpPr/>
+        <p:nvPr/>
+      </p:nvGrpSpPr>
+      <p:grpSpPr>
+        <a:xfrm>
+          <a:off x="0" y="0"/>
+          <a:ext cx="0" cy="0"/>
+          <a:chOff x="0" y="0"/>
+          <a:chExt cx="0" cy="0"/>
+        </a:xfrm>
+      </p:grpSpPr>
+      <p:sp>
+        <p:nvSpPr>
+          <p:cNvPr id="2" name="Title 1"/>
+          <p:cNvSpPr>
+            <a:spLocks noGrp="1"/>
+          </p:cNvSpPr>
+          <p:nvPr>
+            <p:ph type="title"/>
+          </p:nvPr>
+        </p:nvSpPr>
+        <p:spPr/>
+        <p:txBody>
+          <a:bodyPr/>
+          <a:lstStyle/>
+          <a:p>
+            <a:r>
+              <a:rPr lang="en-US" dirty="0" smtClean="0"/>
+              <a:t>Our CQL Schema</a:t>
+            </a:r>
+            <a:endParaRPr lang="en-US" dirty="0"/>
+          </a:p>
+        </p:txBody>
+      </p:sp>
+      <p:pic>
+        <p:nvPicPr>
+          <p:cNvPr id="6" name="Content Placeholder 5"/>
+          <p:cNvPicPr>
+            <a:picLocks noGrp="1" noChangeAspect="1"/>
+          </p:cNvPicPr>
+          <p:nvPr>
+            <p:ph sz="half" idx="1"/>
+          </p:nvPr>
+        </p:nvPicPr>
+        <p:blipFill>
+          <a:blip r:embed="rId2">
+            <a:extLst>
+              <a:ext uri="{28A0092B-C50C-407E-A947-70E740481C1C}">
+                <a14:useLocalDpi xmlns:a14="http://schemas.microsoft.com/office/drawing/2010/main" val="0"/>
+              </a:ext>
+            </a:extLst>
+          </a:blip>
+          <a:stretch>
+            <a:fillRect/>
+          </a:stretch>
+        </p:blipFill>
+        <p:spPr>
+          <a:xfrm>
+            <a:off x="2204589" y="1846263"/>
+            <a:ext cx="2723460" cy="4022725"/>
+          </a:xfrm>
+        </p:spPr>
+      </p:pic>
+      <p:pic>
+        <p:nvPicPr>
+          <p:cNvPr id="7" name="Content Placeholder 6"/>
+          <p:cNvPicPr>
+            <a:picLocks noGrp="1" noChangeAspect="1"/>
+          </p:cNvPicPr>
+          <p:nvPr>
+            <p:ph sz="half" idx="2"/>
+          </p:nvPr>
+        </p:nvPicPr>
+        <p:blipFill>
+          <a:blip r:embed="rId3">
+            <a:extLst>
+              <a:ext uri="{28A0092B-C50C-407E-A947-70E740481C1C}">
+                <a14:useLocalDpi xmlns:a14="http://schemas.microsoft.com/office/drawing/2010/main" val="0"/>
+              </a:ext>
+            </a:extLst>
+          </a:blip>
+          <a:stretch>
+            <a:fillRect/>
+          </a:stretch>
+        </p:blipFill>
+        <p:spPr>
+          <a:xfrm>
+            <a:off x="7246565" y="1846263"/>
+            <a:ext cx="2880470" cy="4022725"/>
+          </a:xfrm>
+        </p:spPr>
+      </p:pic>
+      <p:pic>
+        <p:nvPicPr>
+          <p:cNvPr id="5" name="Picture 2" descr="http://planetcassandra.org/blogs/Upload/Post567/IW_R.png"/>
+          <p:cNvPicPr>
+            <a:picLocks noChangeAspect="1" noChangeArrowheads="1"/>
+          </p:cNvPicPr>
+          <p:nvPr/>
+        </p:nvPicPr>
+        <p:blipFill>
+          <a:blip r:embed="rId4">
+            <a:extLst>
+              <a:ext uri="{28A0092B-C50C-407E-A947-70E740481C1C}">
+                <a14:useLocalDpi xmlns:a14="http://schemas.microsoft.com/office/drawing/2010/main" val="0"/>
+              </a:ext>
+            </a:extLst>
+          </a:blip>
+          <a:srcRect/>
+          <a:stretch>
+            <a:fillRect/>
+          </a:stretch>
+        </p:blipFill>
+        <p:spPr bwMode="auto">
+          <a:xfrm>
+            <a:off x="10782554" y="0"/>
+            <a:ext cx="1409446" cy="1074426"/>
+          </a:xfrm>
+          <a:prstGeom prst="rect">
+            <a:avLst/>
+          </a:prstGeom>
+          <a:noFill/>
+          <a:effectLst>
+            <a:outerShdw blurRad="50800" dist="38100" algn="l" rotWithShape="0">
+              <a:prstClr val="black">
+                <a:alpha val="40000"/>
+              </a:prstClr>
+            </a:outerShdw>
+          </a:effectLst>
+          <a:extLst>
+            <a:ext uri="{909E8E84-426E-40DD-AFC4-6F175D3DCCD1}">
+              <a14:hiddenFill xmlns:a14="http://schemas.microsoft.com/office/drawing/2010/main">
+                <a:solidFill>
+                  <a:srgbClr val="FFFFFF"/>
+                </a:solidFill>
+              </a14:hiddenFill>
+            </a:ext>
+          </a:extLst>
+        </p:spPr>
+      </p:pic>
+      <p:cxnSp>
+        <p:nvCxnSpPr>
+          <p:cNvPr id="9" name="Straight Arrow Connector 8"/>
+          <p:cNvCxnSpPr/>
+          <p:nvPr/>
+        </p:nvCxnSpPr>
+        <p:spPr>
+          <a:xfrm flipH="1">
+            <a:off x="4069494" y="4617308"/>
+            <a:ext cx="1325953" cy="844378"/>
+          </a:xfrm>
+          <a:prstGeom prst="straightConnector1">
+            <a:avLst/>
+          </a:prstGeom>
+          <a:ln>
+            <a:tailEnd type="triangle"/>
+          </a:ln>
+        </p:spPr>
+        <p:style>
+          <a:lnRef idx="1">
+            <a:schemeClr val="accent1"/>
+          </a:lnRef>
+          <a:fillRef idx="0">
+            <a:schemeClr val="accent1"/>
+          </a:fillRef>
+          <a:effectRef idx="0">
+            <a:schemeClr val="accent1"/>
+          </a:effectRef>
+          <a:fontRef idx="minor">
+            <a:schemeClr val="tx1"/>
+          </a:fontRef>
+        </p:style>
+      </p:cxnSp>
+      <p:cxnSp>
+        <p:nvCxnSpPr>
+          <p:cNvPr id="10" name="Straight Arrow Connector 9"/>
+          <p:cNvCxnSpPr/>
+          <p:nvPr/>
+        </p:nvCxnSpPr>
+        <p:spPr>
+          <a:xfrm>
+            <a:off x="6318422" y="4506097"/>
+            <a:ext cx="1527683" cy="222422"/>
+          </a:xfrm>
+          <a:prstGeom prst="straightConnector1">
+            <a:avLst/>
+          </a:prstGeom>
+          <a:ln>
+            <a:tailEnd type="triangle"/>
+          </a:ln>
+        </p:spPr>
+        <p:style>
+          <a:lnRef idx="1">
+            <a:schemeClr val="accent1"/>
+          </a:lnRef>
+          <a:fillRef idx="0">
+            <a:schemeClr val="accent1"/>
+          </a:fillRef>
+          <a:effectRef idx="0">
+            <a:schemeClr val="accent1"/>
+          </a:effectRef>
+          <a:fontRef idx="minor">
+            <a:schemeClr val="tx1"/>
+          </a:fontRef>
+        </p:style>
+      </p:cxnSp>
+      <p:cxnSp>
+        <p:nvCxnSpPr>
+          <p:cNvPr id="13" name="Straight Arrow Connector 12"/>
+          <p:cNvCxnSpPr/>
+          <p:nvPr/>
+        </p:nvCxnSpPr>
+        <p:spPr>
+          <a:xfrm flipV="1">
+            <a:off x="6494624" y="3311611"/>
+            <a:ext cx="1627884" cy="823784"/>
+          </a:xfrm>
+          <a:prstGeom prst="straightConnector1">
+            <a:avLst/>
+          </a:prstGeom>
+          <a:ln>
+            <a:tailEnd type="triangle"/>
+          </a:ln>
+        </p:spPr>
+        <p:style>
+          <a:lnRef idx="1">
+            <a:schemeClr val="accent1"/>
+          </a:lnRef>
+          <a:fillRef idx="0">
+            <a:schemeClr val="accent1"/>
+          </a:fillRef>
+          <a:effectRef idx="0">
+            <a:schemeClr val="accent1"/>
+          </a:effectRef>
+          <a:fontRef idx="minor">
+            <a:schemeClr val="tx1"/>
+          </a:fontRef>
+        </p:style>
+      </p:cxnSp>
+      <p:sp>
+        <p:nvSpPr>
+          <p:cNvPr id="17" name="TextBox 16"/>
+          <p:cNvSpPr txBox="1"/>
+          <p:nvPr/>
+        </p:nvSpPr>
+        <p:spPr>
+          <a:xfrm>
+            <a:off x="5151480" y="3908504"/>
+            <a:ext cx="1356462" cy="1015663"/>
+          </a:xfrm>
+          <a:prstGeom prst="rect">
+            <a:avLst/>
+          </a:prstGeom>
+          <a:noFill/>
+        </p:spPr>
+        <p:txBody>
+          <a:bodyPr wrap="none" rtlCol="0">
+            <a:spAutoFit/>
+          </a:bodyPr>
+          <a:lstStyle/>
+          <a:p>
+            <a:pPr algn="ctr"/>
+            <a:r>
+              <a:rPr lang="en-US" sz="2000" b="1" dirty="0" smtClean="0"/>
+              <a:t>Compound</a:t>
+            </a:r>
+            <a:br>
+              <a:rPr lang="en-US" sz="2000" b="1" dirty="0" smtClean="0"/>
+            </a:br>
+            <a:r>
+              <a:rPr lang="en-US" sz="2000" b="1" dirty="0" smtClean="0"/>
+              <a:t>Primary</a:t>
+            </a:r>
+            <a:br>
+              <a:rPr lang="en-US" sz="2000" b="1" dirty="0" smtClean="0"/>
+            </a:br>
+            <a:r>
+              <a:rPr lang="en-US" sz="2000" b="1" dirty="0" smtClean="0"/>
+              <a:t>Keys</a:t>
+            </a:r>
+            <a:endParaRPr lang="en-US" sz="2000" b="1" dirty="0"/>
+          </a:p>
+        </p:txBody>
+      </p:sp>
+    </p:spTree>
+    <p:extLst>
+      <p:ext uri="{BB962C8B-B14F-4D97-AF65-F5344CB8AC3E}">
+        <p14:creationId xmlns:p14="http://schemas.microsoft.com/office/powerpoint/2010/main" val="2463073811"/>
+      </p:ext>
+    </p:extLst>
+  </p:cSld>
+  <p:clrMapOvr>
+    <a:masterClrMapping/>
+  </p:clrMapOvr>
+  <p:timing>
+    <p:tnLst>
+      <p:par>
+        <p:cTn id="1" dur="indefinite" restart="never" nodeType="tmRoot"/>
+      </p:par>
+    </p:tnLst>
+  </p:timing>
+</p:sld>
+</file>
+
+<file path=ppt/slides/slide11.xml><?xml version="1.0" encoding="utf-8"?>
+<p:sld xmlns:a="http://schemas.openxmlformats.org/drawingml/2006/main" xmlns:r="http://schemas.openxmlformats.org/officeDocument/2006/relationships" xmlns:p="http://schemas.openxmlformats.org/presentationml/2006/main">
+  <p:cSld>
+    <p:spTree>
+      <p:nvGrpSpPr>
+        <p:cNvPr id="1" name=""/>
+        <p:cNvGrpSpPr/>
+        <p:nvPr/>
+      </p:nvGrpSpPr>
+      <p:grpSpPr>
+        <a:xfrm>
+          <a:off x="0" y="0"/>
+          <a:ext cx="0" cy="0"/>
+          <a:chOff x="0" y="0"/>
+          <a:chExt cx="0" cy="0"/>
+        </a:xfrm>
+      </p:grpSpPr>
+      <p:sp>
+        <p:nvSpPr>
+          <p:cNvPr id="2" name="Title 1"/>
+          <p:cNvSpPr>
+            <a:spLocks noGrp="1"/>
+          </p:cNvSpPr>
+          <p:nvPr>
+            <p:ph type="title"/>
+          </p:nvPr>
+        </p:nvSpPr>
+        <p:spPr/>
+        <p:txBody>
+          <a:bodyPr/>
+          <a:lstStyle/>
+          <a:p>
+            <a:r>
+              <a:rPr lang="en-US" dirty="0" smtClean="0"/>
+              <a:t>A bit more detail about the design</a:t>
+            </a:r>
+            <a:endParaRPr lang="en-US" dirty="0"/>
+          </a:p>
+        </p:txBody>
+      </p:sp>
+      <p:sp>
+        <p:nvSpPr>
+          <p:cNvPr id="3" name="Content Placeholder 2"/>
+          <p:cNvSpPr>
+            <a:spLocks noGrp="1"/>
+          </p:cNvSpPr>
+          <p:nvPr>
+            <p:ph idx="1"/>
+          </p:nvPr>
+        </p:nvSpPr>
+        <p:spPr/>
+        <p:txBody>
+          <a:bodyPr/>
+          <a:lstStyle/>
+          <a:p>
+            <a:r>
+              <a:rPr lang="en-US" dirty="0" smtClean="0"/>
+              <a:t>You’ll notice that </a:t>
+            </a:r>
+            <a:r>
+              <a:rPr lang="en-US" b="1" dirty="0" smtClean="0"/>
+              <a:t>the design of the schema is geared around how the data will be queried. </a:t>
+            </a:r>
+            <a:r>
+              <a:rPr lang="en-US" dirty="0" smtClean="0"/>
+              <a:t>This is important because it runs contrary to how we’re used to setting up schemas in the relational world where the entities normally closely follow our class model.</a:t>
+            </a:r>
+          </a:p>
+          <a:p>
+            <a:r>
+              <a:rPr lang="en-US" b="1" dirty="0" smtClean="0"/>
+              <a:t>PRIMARY KEY (Partition Key, Clustering Column, Clustering Column, </a:t>
+            </a:r>
+            <a:r>
+              <a:rPr lang="en-US" b="1" dirty="0" err="1" smtClean="0"/>
+              <a:t>Clus</a:t>
+            </a:r>
+            <a:r>
+              <a:rPr lang="en-US" b="1" dirty="0" smtClean="0"/>
+              <a:t>...)</a:t>
+            </a:r>
+          </a:p>
+          <a:p>
+            <a:r>
+              <a:rPr lang="en-US" dirty="0" smtClean="0"/>
+              <a:t>The reason we’re using compound primary keys is due to the way Cassandra stores data. When you use a compound primary key, all the data matching the first component of the compound key, known as the partition key, is grouped together. This means that when we query using this key alone, or this key with a range of clustering columns, Cassandra is able to retrieve the data without seeking out each individual row for the clustering columns.</a:t>
+            </a:r>
+          </a:p>
+          <a:p>
+            <a:r>
+              <a:rPr lang="en-US" dirty="0" smtClean="0"/>
+              <a:t>This allows us to efficiently read the data from all items inside a folder without performing additional seeking for each item.</a:t>
+            </a:r>
+            <a:endParaRPr lang="en-US" dirty="0"/>
+          </a:p>
+        </p:txBody>
+      </p:sp>
+    </p:spTree>
+    <p:extLst>
+      <p:ext uri="{BB962C8B-B14F-4D97-AF65-F5344CB8AC3E}">
+        <p14:creationId xmlns:p14="http://schemas.microsoft.com/office/powerpoint/2010/main" val="4107781980"/>
+      </p:ext>
+    </p:extLst>
+  </p:cSld>
+  <p:clrMapOvr>
+    <a:masterClrMapping/>
+  </p:clrMapOvr>
+  <p:timing>
+    <p:tnLst>
+      <p:par>
+        <p:cTn id="1" dur="indefinite" restart="never" nodeType="tmRoot"/>
+      </p:par>
+    </p:tnLst>
+  </p:timing>
 </p:sld>
 </file>
 
@@ -3914,15 +4397,7 @@
           <a:p>
             <a:r>
               <a:rPr lang="en-US" dirty="0" smtClean="0"/>
-              <a:t>Oh </a:t>
-            </a:r>
-            <a:r>
-              <a:rPr lang="en-US" dirty="0" smtClean="0"/>
-              <a:t>noes</a:t>
-            </a:r>
-            <a:r>
-              <a:rPr lang="en-US" dirty="0" smtClean="0"/>
-              <a:t>! Inventory woes!</a:t>
+              <a:t>Oh noes! Inventory woes!</a:t>
             </a:r>
             <a:endParaRPr lang="en-US" dirty="0"/>
           </a:p>
@@ -5020,7 +5495,15 @@
             </a:r>
             <a:r>
               <a:rPr lang="en-US" dirty="0" smtClean="0"/>
-              <a:t> is downloaded and set up, starting single node Cassandra cluster is super easy:</a:t>
+              <a:t> is downloaded and set up, starting </a:t>
+            </a:r>
+            <a:r>
+              <a:rPr lang="en-US" dirty="0" smtClean="0"/>
+              <a:t>a single </a:t>
+            </a:r>
+            <a:r>
+              <a:rPr lang="en-US" dirty="0" smtClean="0"/>
+              <a:t>node Cassandra cluster is super easy:</a:t>
             </a:r>
           </a:p>
           <a:p>
@@ -5091,6 +5574,54 @@
           </a:p>
         </p:txBody>
       </p:sp>
+      <p:pic>
+        <p:nvPicPr>
+          <p:cNvPr id="7" name="Picture 2" descr="http://planetcassandra.org/blogs/Upload/Post567/IW_R.png"/>
+          <p:cNvPicPr>
+            <a:picLocks noChangeAspect="1" noChangeArrowheads="1"/>
+          </p:cNvPicPr>
+          <p:nvPr/>
+        </p:nvPicPr>
+        <p:blipFill>
+          <a:blip r:embed="rId5">
+            <a:extLst>
+              <a:ext uri="{28A0092B-C50C-407E-A947-70E740481C1C}">
+                <a14:useLocalDpi xmlns:a14="http://schemas.microsoft.com/office/drawing/2010/main" val="0"/>
+              </a:ext>
+            </a:extLst>
+          </a:blip>
+          <a:srcRect/>
+          <a:stretch>
+            <a:fillRect/>
+          </a:stretch>
+        </p:blipFill>
+        <p:spPr bwMode="auto">
+          <a:xfrm>
+            <a:off x="10782554" y="0"/>
+            <a:ext cx="1409446" cy="1074426"/>
+          </a:xfrm>
+          <a:prstGeom prst="rect">
+            <a:avLst/>
+          </a:prstGeom>
+          <a:noFill/>
+          <a:effectLst>
+            <a:outerShdw blurRad="50800" dist="38100" algn="l" rotWithShape="0">
+              <a:prstClr val="black">
+                <a:alpha val="40000"/>
+              </a:prstClr>
+            </a:outerShdw>
+          </a:effectLst>
+          <a:extLst>
+            <a:ext uri="{909E8E84-426E-40DD-AFC4-6F175D3DCCD1}">
+              <a14:hiddenFill xmlns:a14="http://schemas.microsoft.com/office/drawing/2010/main">
+                <a:solidFill>
+                  <a:srgbClr val="FFFFFF"/>
+                </a:solidFill>
+              </a14:hiddenFill>
+            </a:ext>
+          </a:extLst>
+        </p:spPr>
+      </p:pic>
     </p:spTree>
     <p:extLst>
       <p:ext uri="{BB962C8B-B14F-4D97-AF65-F5344CB8AC3E}">
@@ -5101,6 +5632,390 @@
   <p:clrMapOvr>
     <a:masterClrMapping/>
   </p:clrMapOvr>
+</p:sld>
+</file>
+
+<file path=ppt/slides/slide8.xml><?xml version="1.0" encoding="utf-8"?>
+<p:sld xmlns:a="http://schemas.openxmlformats.org/drawingml/2006/main" xmlns:r="http://schemas.openxmlformats.org/officeDocument/2006/relationships" xmlns:p="http://schemas.openxmlformats.org/presentationml/2006/main">
+  <p:cSld>
+    <p:spTree>
+      <p:nvGrpSpPr>
+        <p:cNvPr id="1" name=""/>
+        <p:cNvGrpSpPr/>
+        <p:nvPr/>
+      </p:nvGrpSpPr>
+      <p:grpSpPr>
+        <a:xfrm>
+          <a:off x="0" y="0"/>
+          <a:ext cx="0" cy="0"/>
+          <a:chOff x="0" y="0"/>
+          <a:chExt cx="0" cy="0"/>
+        </a:xfrm>
+      </p:grpSpPr>
+      <p:sp>
+        <p:nvSpPr>
+          <p:cNvPr id="2" name="Title 1"/>
+          <p:cNvSpPr>
+            <a:spLocks noGrp="1"/>
+          </p:cNvSpPr>
+          <p:nvPr>
+            <p:ph type="title"/>
+          </p:nvPr>
+        </p:nvSpPr>
+        <p:spPr/>
+        <p:txBody>
+          <a:bodyPr/>
+          <a:lstStyle/>
+          <a:p>
+            <a:r>
+              <a:rPr lang="en-US" dirty="0" smtClean="0"/>
+              <a:t>CQL: Like SQL but different</a:t>
+            </a:r>
+            <a:endParaRPr lang="en-US" dirty="0"/>
+          </a:p>
+        </p:txBody>
+      </p:sp>
+      <p:sp>
+        <p:nvSpPr>
+          <p:cNvPr id="3" name="Content Placeholder 2"/>
+          <p:cNvSpPr>
+            <a:spLocks noGrp="1"/>
+          </p:cNvSpPr>
+          <p:nvPr>
+            <p:ph idx="1"/>
+          </p:nvPr>
+        </p:nvSpPr>
+        <p:spPr/>
+        <p:txBody>
+          <a:bodyPr/>
+          <a:lstStyle/>
+          <a:p>
+            <a:r>
+              <a:rPr lang="en-US" dirty="0" smtClean="0"/>
+              <a:t>Originally when Cassandra made its debut, the only way to get at the data was to use Thrift calls that pulled and updated columns very much like working with a hash set.</a:t>
+            </a:r>
+          </a:p>
+          <a:p>
+            <a:r>
+              <a:rPr lang="en-US" dirty="0" smtClean="0"/>
+              <a:t>Cassandra then developed CQL (Cassandra Query Language) which is a familiar cousin of SQL with the following notable exceptions:</a:t>
+            </a:r>
+          </a:p>
+          <a:p>
+            <a:pPr>
+              <a:buFont typeface="Wingdings" panose="05000000000000000000" pitchFamily="2" charset="2"/>
+              <a:buChar char="q"/>
+            </a:pPr>
+            <a:r>
+              <a:rPr lang="en-US" dirty="0" smtClean="0"/>
+              <a:t>No joins. No GROUP BY. Data in Cassandra is expected to be mostly </a:t>
+            </a:r>
+            <a:r>
+              <a:rPr lang="en-US" dirty="0" err="1" smtClean="0"/>
+              <a:t>denormalized</a:t>
+            </a:r>
+            <a:r>
+              <a:rPr lang="en-US" dirty="0" smtClean="0"/>
+              <a:t>. Cassandra writes are extremely fast, faster than reads, which mitigates the extra write penalty.</a:t>
+            </a:r>
+          </a:p>
+          <a:p>
+            <a:pPr>
+              <a:buFont typeface="Wingdings" panose="05000000000000000000" pitchFamily="2" charset="2"/>
+              <a:buChar char="q"/>
+            </a:pPr>
+            <a:r>
+              <a:rPr lang="en-US" dirty="0" smtClean="0"/>
+              <a:t>Cassandra supports compound keys and data that has the data grouped together by the partition key (</a:t>
+            </a:r>
+            <a:r>
+              <a:rPr lang="en-US" b="1" dirty="0" smtClean="0"/>
+              <a:t>important! </a:t>
+            </a:r>
+            <a:r>
+              <a:rPr lang="en-US" dirty="0" smtClean="0"/>
+              <a:t>more on this later)</a:t>
+            </a:r>
+          </a:p>
+          <a:p>
+            <a:pPr>
+              <a:buFont typeface="Wingdings" panose="05000000000000000000" pitchFamily="2" charset="2"/>
+              <a:buChar char="q"/>
+            </a:pPr>
+            <a:r>
+              <a:rPr lang="en-US" dirty="0" smtClean="0"/>
+              <a:t>You can not use a WHERE clause to filter on columns that aren’t part of the row key or a secondary index.  Partition keys must be queried using the = operator or IN statements.</a:t>
+            </a:r>
+          </a:p>
+          <a:p>
+            <a:pPr>
+              <a:buFont typeface="Wingdings" panose="05000000000000000000" pitchFamily="2" charset="2"/>
+              <a:buChar char="q"/>
+            </a:pPr>
+            <a:r>
+              <a:rPr lang="en-US" dirty="0" smtClean="0"/>
+              <a:t>These rules and features keep you from shooting yourself in the foot.</a:t>
+            </a:r>
+            <a:endParaRPr lang="en-US" dirty="0"/>
+          </a:p>
+        </p:txBody>
+      </p:sp>
+      <p:pic>
+        <p:nvPicPr>
+          <p:cNvPr id="4" name="Picture 2" descr="http://planetcassandra.org/blogs/Upload/Post567/IW_R.png"/>
+          <p:cNvPicPr>
+            <a:picLocks noChangeAspect="1" noChangeArrowheads="1"/>
+          </p:cNvPicPr>
+          <p:nvPr/>
+        </p:nvPicPr>
+        <p:blipFill>
+          <a:blip r:embed="rId2">
+            <a:extLst>
+              <a:ext uri="{28A0092B-C50C-407E-A947-70E740481C1C}">
+                <a14:useLocalDpi xmlns:a14="http://schemas.microsoft.com/office/drawing/2010/main" val="0"/>
+              </a:ext>
+            </a:extLst>
+          </a:blip>
+          <a:srcRect/>
+          <a:stretch>
+            <a:fillRect/>
+          </a:stretch>
+        </p:blipFill>
+        <p:spPr bwMode="auto">
+          <a:xfrm>
+            <a:off x="10782554" y="0"/>
+            <a:ext cx="1409446" cy="1074426"/>
+          </a:xfrm>
+          <a:prstGeom prst="rect">
+            <a:avLst/>
+          </a:prstGeom>
+          <a:noFill/>
+          <a:effectLst>
+            <a:outerShdw blurRad="50800" dist="38100" algn="l" rotWithShape="0">
+              <a:prstClr val="black">
+                <a:alpha val="40000"/>
+              </a:prstClr>
+            </a:outerShdw>
+          </a:effectLst>
+          <a:extLst>
+            <a:ext uri="{909E8E84-426E-40DD-AFC4-6F175D3DCCD1}">
+              <a14:hiddenFill xmlns:a14="http://schemas.microsoft.com/office/drawing/2010/main">
+                <a:solidFill>
+                  <a:srgbClr val="FFFFFF"/>
+                </a:solidFill>
+              </a14:hiddenFill>
+            </a:ext>
+          </a:extLst>
+        </p:spPr>
+      </p:pic>
+    </p:spTree>
+    <p:extLst>
+      <p:ext uri="{BB962C8B-B14F-4D97-AF65-F5344CB8AC3E}">
+        <p14:creationId xmlns:p14="http://schemas.microsoft.com/office/powerpoint/2010/main" val="2598162185"/>
+      </p:ext>
+    </p:extLst>
+  </p:cSld>
+  <p:clrMapOvr>
+    <a:masterClrMapping/>
+  </p:clrMapOvr>
+  <p:timing>
+    <p:tnLst>
+      <p:par>
+        <p:cTn id="1" dur="indefinite" restart="never" nodeType="tmRoot"/>
+      </p:par>
+    </p:tnLst>
+  </p:timing>
+</p:sld>
+</file>
+
+<file path=ppt/slides/slide9.xml><?xml version="1.0" encoding="utf-8"?>
+<p:sld xmlns:a="http://schemas.openxmlformats.org/drawingml/2006/main" xmlns:r="http://schemas.openxmlformats.org/officeDocument/2006/relationships" xmlns:p="http://schemas.openxmlformats.org/presentationml/2006/main">
+  <p:cSld>
+    <p:spTree>
+      <p:nvGrpSpPr>
+        <p:cNvPr id="1" name=""/>
+        <p:cNvGrpSpPr/>
+        <p:nvPr/>
+      </p:nvGrpSpPr>
+      <p:grpSpPr>
+        <a:xfrm>
+          <a:off x="0" y="0"/>
+          <a:ext cx="0" cy="0"/>
+          <a:chOff x="0" y="0"/>
+          <a:chExt cx="0" cy="0"/>
+        </a:xfrm>
+      </p:grpSpPr>
+      <p:sp>
+        <p:nvSpPr>
+          <p:cNvPr id="2" name="Title 1"/>
+          <p:cNvSpPr>
+            <a:spLocks noGrp="1"/>
+          </p:cNvSpPr>
+          <p:nvPr>
+            <p:ph type="title"/>
+          </p:nvPr>
+        </p:nvSpPr>
+        <p:spPr/>
+        <p:txBody>
+          <a:bodyPr/>
+          <a:lstStyle/>
+          <a:p>
+            <a:r>
+              <a:rPr lang="en-US" dirty="0" smtClean="0"/>
+              <a:t>CQL Inventory schema design</a:t>
+            </a:r>
+            <a:endParaRPr lang="en-US" dirty="0"/>
+          </a:p>
+        </p:txBody>
+      </p:sp>
+      <p:sp>
+        <p:nvSpPr>
+          <p:cNvPr id="3" name="Content Placeholder 2"/>
+          <p:cNvSpPr>
+            <a:spLocks noGrp="1"/>
+          </p:cNvSpPr>
+          <p:nvPr>
+            <p:ph idx="1"/>
+          </p:nvPr>
+        </p:nvSpPr>
+        <p:spPr/>
+        <p:txBody>
+          <a:bodyPr/>
+          <a:lstStyle/>
+          <a:p>
+            <a:r>
+              <a:rPr lang="en-US" dirty="0" smtClean="0"/>
+              <a:t>Things to keep in mind:</a:t>
+            </a:r>
+          </a:p>
+          <a:p>
+            <a:pPr>
+              <a:buFont typeface="Wingdings" panose="05000000000000000000" pitchFamily="2" charset="2"/>
+              <a:buChar char="v"/>
+            </a:pPr>
+            <a:r>
+              <a:rPr lang="en-US" dirty="0" smtClean="0"/>
+              <a:t>SL based viewers don’t request subfolders individually in inventory fetch. The protocol CAN do this, but instead, all folders and subfolders are retrieved as part of the skeleton during login.</a:t>
+            </a:r>
+          </a:p>
+          <a:p>
+            <a:pPr>
+              <a:buFont typeface="Wingdings" panose="05000000000000000000" pitchFamily="2" charset="2"/>
+              <a:buChar char="v"/>
+            </a:pPr>
+            <a:r>
+              <a:rPr lang="en-US" dirty="0" smtClean="0"/>
+              <a:t>All items inside an individual folder are requested at once. We want to optimize reads based on this fact and not turn every item into an individual random IO. We can use a compound key to achieve this.</a:t>
+            </a:r>
+          </a:p>
+          <a:p>
+            <a:pPr>
+              <a:buFont typeface="Wingdings" panose="05000000000000000000" pitchFamily="2" charset="2"/>
+              <a:buChar char="v"/>
+            </a:pPr>
+            <a:r>
+              <a:rPr lang="en-US" dirty="0" smtClean="0"/>
+              <a:t>Items are </a:t>
+            </a:r>
+            <a:r>
+              <a:rPr lang="en-US" dirty="0" err="1" smtClean="0"/>
+              <a:t>rezzed</a:t>
+            </a:r>
+            <a:r>
+              <a:rPr lang="en-US" dirty="0" smtClean="0"/>
+              <a:t> into the world based on their UUID. Therefore we need to map item IDs back to their parent folder ID. We’ll do this explicitly and avoid secondary indexes which seem to have issues with becoming stale as of writing based on mailing list traffic.</a:t>
+            </a:r>
+          </a:p>
+          <a:p>
+            <a:pPr>
+              <a:buFont typeface="Wingdings" panose="05000000000000000000" pitchFamily="2" charset="2"/>
+              <a:buChar char="v"/>
+            </a:pPr>
+            <a:r>
+              <a:rPr lang="en-US" dirty="0" smtClean="0"/>
+              <a:t>All folders have version numbers that get incremented when items or subfolders and changed, created, moved, or deleted. We’ll use a special CQL column called a counter for this.</a:t>
+            </a:r>
+          </a:p>
+          <a:p>
+            <a:pPr>
+              <a:buFont typeface="Wingdings" panose="05000000000000000000" pitchFamily="2" charset="2"/>
+              <a:buChar char="v"/>
+            </a:pPr>
+            <a:endParaRPr lang="en-US" dirty="0" smtClean="0"/>
+          </a:p>
+          <a:p>
+            <a:pPr marL="0" indent="0">
+              <a:buNone/>
+            </a:pPr>
+            <a:endParaRPr lang="en-US" dirty="0"/>
+          </a:p>
+        </p:txBody>
+      </p:sp>
+      <p:pic>
+        <p:nvPicPr>
+          <p:cNvPr id="4" name="Picture 2" descr="http://planetcassandra.org/blogs/Upload/Post567/IW_R.png"/>
+          <p:cNvPicPr>
+            <a:picLocks noChangeAspect="1" noChangeArrowheads="1"/>
+          </p:cNvPicPr>
+          <p:nvPr/>
+        </p:nvPicPr>
+        <p:blipFill>
+          <a:blip r:embed="rId2">
+            <a:extLst>
+              <a:ext uri="{28A0092B-C50C-407E-A947-70E740481C1C}">
+                <a14:useLocalDpi xmlns:a14="http://schemas.microsoft.com/office/drawing/2010/main" val="0"/>
+              </a:ext>
+            </a:extLst>
+          </a:blip>
+          <a:srcRect/>
+          <a:stretch>
+            <a:fillRect/>
+          </a:stretch>
+        </p:blipFill>
+        <p:spPr bwMode="auto">
+          <a:xfrm>
+            <a:off x="10782554" y="0"/>
+            <a:ext cx="1409446" cy="1074426"/>
+          </a:xfrm>
+          <a:prstGeom prst="rect">
+            <a:avLst/>
+          </a:prstGeom>
+          <a:noFill/>
+          <a:effectLst>
+            <a:outerShdw blurRad="50800" dist="38100" algn="l" rotWithShape="0">
+              <a:prstClr val="black">
+                <a:alpha val="40000"/>
+              </a:prstClr>
+            </a:outerShdw>
+          </a:effectLst>
+          <a:extLst>
+            <a:ext uri="{909E8E84-426E-40DD-AFC4-6F175D3DCCD1}">
+              <a14:hiddenFill xmlns:a14="http://schemas.microsoft.com/office/drawing/2010/main">
+                <a:solidFill>
+                  <a:srgbClr val="FFFFFF"/>
+                </a:solidFill>
+              </a14:hiddenFill>
+            </a:ext>
+          </a:extLst>
+        </p:spPr>
+      </p:pic>
+    </p:spTree>
+    <p:extLst>
+      <p:ext uri="{BB962C8B-B14F-4D97-AF65-F5344CB8AC3E}">
+        <p14:creationId xmlns:p14="http://schemas.microsoft.com/office/powerpoint/2010/main" val="190458006"/>
+      </p:ext>
+    </p:extLst>
+  </p:cSld>
+  <p:clrMapOvr>
+    <a:masterClrMapping/>
+  </p:clrMapOvr>
+  <p:timing>
+    <p:tnLst>
+      <p:par>
+        <p:cTn id="1" dur="indefinite" restart="never" nodeType="tmRoot"/>
+      </p:par>
+    </p:tnLst>
+  </p:timing>
 </p:sld>
 </file>
 

</xml_diff>

<commit_message>
Finished Presentation  - Commit the finished presentation slides.  - Commit the (hopefully) final CQL schema.cql  - Commit the initial project
</commit_message>
<xml_diff>
--- a/presentation/Scaling OpenSimulator Inventory using NoSQL.pptx
+++ b/presentation/Scaling OpenSimulator Inventory using NoSQL.pptx
@@ -16,6 +16,7 @@
     <p:sldId id="264" r:id="rId10"/>
     <p:sldId id="265" r:id="rId11"/>
     <p:sldId id="266" r:id="rId12"/>
+    <p:sldId id="267" r:id="rId13"/>
   </p:sldIdLst>
   <p:sldSz cx="12192000" cy="6858000"/>
   <p:notesSz cx="6858000" cy="9144000"/>
@@ -348,7 +349,7 @@
           <a:p>
             <a:fld id="{4BDF68E2-58F2-4D09-BE8B-E3BD06533059}" type="datetimeFigureOut">
               <a:rPr lang="en-US" dirty="0"/>
-              <a:t>10/23/2014</a:t>
+              <a:t>10/24/2014</a:t>
             </a:fld>
             <a:endParaRPr lang="en-US" dirty="0"/>
           </a:p>
@@ -551,7 +552,7 @@
           <a:p>
             <a:fld id="{2E2D6473-DF6D-4702-B328-E0DD40540A4E}" type="datetimeFigureOut">
               <a:rPr lang="en-US" dirty="0"/>
-              <a:t>10/23/2014</a:t>
+              <a:t>10/24/2014</a:t>
             </a:fld>
             <a:endParaRPr lang="en-US" dirty="0"/>
           </a:p>
@@ -802,7 +803,7 @@
           <a:p>
             <a:fld id="{E26F7E3A-B166-407D-9866-32884E7D5B37}" type="datetimeFigureOut">
               <a:rPr lang="en-US" dirty="0"/>
-              <a:t>10/23/2014</a:t>
+              <a:t>10/24/2014</a:t>
             </a:fld>
             <a:endParaRPr lang="en-US" dirty="0"/>
           </a:p>
@@ -971,7 +972,7 @@
           <a:p>
             <a:fld id="{528FC5F6-F338-4AE4-BB23-26385BCFC423}" type="datetimeFigureOut">
               <a:rPr lang="en-US" dirty="0"/>
-              <a:t>10/23/2014</a:t>
+              <a:t>10/24/2014</a:t>
             </a:fld>
             <a:endParaRPr lang="en-US" dirty="0"/>
           </a:p>
@@ -1309,7 +1310,7 @@
           <a:p>
             <a:fld id="{20EBB0C4-6273-4C6E-B9BD-2EDC30F1CD52}" type="datetimeFigureOut">
               <a:rPr lang="en-US" dirty="0"/>
-              <a:t>10/23/2014</a:t>
+              <a:t>10/24/2014</a:t>
             </a:fld>
             <a:endParaRPr lang="en-US" dirty="0"/>
           </a:p>
@@ -1579,7 +1580,7 @@
           <a:p>
             <a:fld id="{19AB4D41-86C1-4908-B66A-0B50CEB3BF29}" type="datetimeFigureOut">
               <a:rPr lang="en-US" dirty="0"/>
-              <a:t>10/23/2014</a:t>
+              <a:t>10/24/2014</a:t>
             </a:fld>
             <a:endParaRPr lang="en-US" dirty="0"/>
           </a:p>
@@ -1953,7 +1954,7 @@
           <a:p>
             <a:fld id="{E6426E2C-56C1-4E0D-A793-0088A7FDD37E}" type="datetimeFigureOut">
               <a:rPr lang="en-US" dirty="0"/>
-              <a:t>10/23/2014</a:t>
+              <a:t>10/24/2014</a:t>
             </a:fld>
             <a:endParaRPr lang="en-US" dirty="0"/>
           </a:p>
@@ -2066,7 +2067,7 @@
           <a:p>
             <a:fld id="{C8C39B41-D8B5-4052-B551-9B5525EAA8B6}" type="datetimeFigureOut">
               <a:rPr lang="en-US" dirty="0"/>
-              <a:t>10/23/2014</a:t>
+              <a:t>10/24/2014</a:t>
             </a:fld>
             <a:endParaRPr lang="en-US" dirty="0"/>
           </a:p>
@@ -2232,7 +2233,7 @@
           <a:p>
             <a:fld id="{4D94136C-8742-45B2-AF27-D93DF72833A9}" type="datetimeFigureOut">
               <a:rPr lang="en-US" dirty="0"/>
-              <a:t>10/23/2014</a:t>
+              <a:t>10/24/2014</a:t>
             </a:fld>
             <a:endParaRPr lang="en-US" dirty="0"/>
           </a:p>
@@ -2582,7 +2583,7 @@
           <a:p>
             <a:fld id="{32ABBEA6-7C60-4B02-AE87-00D78D8422AF}" type="datetimeFigureOut">
               <a:rPr lang="en-US" dirty="0"/>
-              <a:t>10/23/2014</a:t>
+              <a:t>10/24/2014</a:t>
             </a:fld>
             <a:endParaRPr lang="en-US" dirty="0"/>
           </a:p>
@@ -2960,7 +2961,7 @@
           <a:p>
             <a:fld id="{C9CAD897-D46E-4AD2-BD9B-49DD3E640873}" type="datetimeFigureOut">
               <a:rPr lang="en-US" dirty="0"/>
-              <a:t>10/23/2014</a:t>
+              <a:t>10/24/2014</a:t>
             </a:fld>
             <a:endParaRPr lang="en-US" dirty="0"/>
           </a:p>
@@ -3242,7 +3243,7 @@
           <a:p>
             <a:fld id="{98624D31-43A5-475A-80CF-332C9F6DCF35}" type="datetimeFigureOut">
               <a:rPr lang="en-US" dirty="0"/>
-              <a:t>10/23/2014</a:t>
+              <a:t>10/24/2014</a:t>
             </a:fld>
             <a:endParaRPr lang="en-US" dirty="0"/>
           </a:p>
@@ -4363,6 +4364,205 @@
 </p:sld>
 </file>
 
+<file path=ppt/slides/slide12.xml><?xml version="1.0" encoding="utf-8"?>
+<p:sld xmlns:a="http://schemas.openxmlformats.org/drawingml/2006/main" xmlns:r="http://schemas.openxmlformats.org/officeDocument/2006/relationships" xmlns:p="http://schemas.openxmlformats.org/presentationml/2006/main">
+  <p:cSld>
+    <p:spTree>
+      <p:nvGrpSpPr>
+        <p:cNvPr id="1" name=""/>
+        <p:cNvGrpSpPr/>
+        <p:nvPr/>
+      </p:nvGrpSpPr>
+      <p:grpSpPr>
+        <a:xfrm>
+          <a:off x="0" y="0"/>
+          <a:ext cx="0" cy="0"/>
+          <a:chOff x="0" y="0"/>
+          <a:chExt cx="0" cy="0"/>
+        </a:xfrm>
+      </p:grpSpPr>
+      <p:sp>
+        <p:nvSpPr>
+          <p:cNvPr id="2" name="Title 1"/>
+          <p:cNvSpPr>
+            <a:spLocks noGrp="1"/>
+          </p:cNvSpPr>
+          <p:nvPr>
+            <p:ph type="title"/>
+          </p:nvPr>
+        </p:nvSpPr>
+        <p:spPr/>
+        <p:txBody>
+          <a:bodyPr/>
+          <a:lstStyle/>
+          <a:p>
+            <a:r>
+              <a:rPr lang="en-US" dirty="0" smtClean="0"/>
+              <a:t>To the code! .. But first</a:t>
+            </a:r>
+            <a:endParaRPr lang="en-US" dirty="0"/>
+          </a:p>
+        </p:txBody>
+      </p:sp>
+      <p:sp>
+        <p:nvSpPr>
+          <p:cNvPr id="3" name="Content Placeholder 2"/>
+          <p:cNvSpPr>
+            <a:spLocks noGrp="1"/>
+          </p:cNvSpPr>
+          <p:nvPr>
+            <p:ph idx="1"/>
+          </p:nvPr>
+        </p:nvSpPr>
+        <p:spPr>
+          <a:xfrm>
+            <a:off x="1097280" y="1845734"/>
+            <a:ext cx="10058400" cy="4023360"/>
+          </a:xfrm>
+        </p:spPr>
+        <p:txBody>
+          <a:bodyPr/>
+          <a:lstStyle/>
+          <a:p>
+            <a:r>
+              <a:rPr lang="en-US" dirty="0" smtClean="0"/>
+              <a:t>A few things to remember:</a:t>
+            </a:r>
+          </a:p>
+          <a:p>
+            <a:pPr>
+              <a:buFont typeface="Wingdings" panose="05000000000000000000" pitchFamily="2" charset="2"/>
+              <a:buChar char="v"/>
+            </a:pPr>
+            <a:r>
+              <a:rPr lang="en-US" dirty="0" smtClean="0"/>
+              <a:t> Since we’re maintaining a </a:t>
+            </a:r>
+            <a:r>
+              <a:rPr lang="en-US" dirty="0" err="1" smtClean="0"/>
+              <a:t>denormalized</a:t>
+            </a:r>
+            <a:r>
+              <a:rPr lang="en-US" dirty="0" smtClean="0"/>
+              <a:t> dataset, we need to make sure updates to item/folder parentage and versioning are reflected in all related tables</a:t>
+            </a:r>
+            <a:br>
+              <a:rPr lang="en-US" dirty="0" smtClean="0"/>
+            </a:br>
+            <a:r>
+              <a:rPr lang="en-US" dirty="0" smtClean="0"/>
+              <a:t/>
+            </a:r>
+            <a:br>
+              <a:rPr lang="en-US" dirty="0" smtClean="0"/>
+            </a:br>
+            <a:r>
+              <a:rPr lang="en-US" dirty="0" smtClean="0"/>
+              <a:t>Remember</a:t>
+            </a:r>
+          </a:p>
+          <a:p>
+            <a:pPr lvl="1">
+              <a:buFont typeface="Wingdings" panose="05000000000000000000" pitchFamily="2" charset="2"/>
+              <a:buChar char="v"/>
+            </a:pPr>
+            <a:r>
+              <a:rPr lang="en-US" dirty="0" smtClean="0"/>
+              <a:t>Moving a folder requires you to alter the skeletons table, and update the </a:t>
+            </a:r>
+            <a:r>
+              <a:rPr lang="en-US" dirty="0" err="1" smtClean="0"/>
+              <a:t>folder_versions</a:t>
+            </a:r>
+            <a:r>
+              <a:rPr lang="en-US" dirty="0" smtClean="0"/>
+              <a:t> table.</a:t>
+            </a:r>
+          </a:p>
+          <a:p>
+            <a:pPr lvl="1">
+              <a:buFont typeface="Wingdings" panose="05000000000000000000" pitchFamily="2" charset="2"/>
+              <a:buChar char="v"/>
+            </a:pPr>
+            <a:r>
+              <a:rPr lang="en-US" smtClean="0"/>
+              <a:t>Renaming </a:t>
+            </a:r>
+            <a:r>
+              <a:rPr lang="en-US" dirty="0" smtClean="0"/>
+              <a:t>a folder requires you to alter skeletons, folders, and </a:t>
+            </a:r>
+            <a:r>
+              <a:rPr lang="en-US" dirty="0" err="1" smtClean="0"/>
+              <a:t>folder_versions</a:t>
+            </a:r>
+            <a:r>
+              <a:rPr lang="en-US" dirty="0" smtClean="0"/>
+              <a:t> tables.</a:t>
+            </a:r>
+          </a:p>
+          <a:p>
+            <a:pPr lvl="1">
+              <a:buFont typeface="Wingdings" panose="05000000000000000000" pitchFamily="2" charset="2"/>
+              <a:buChar char="v"/>
+            </a:pPr>
+            <a:r>
+              <a:rPr lang="en-US" dirty="0" smtClean="0"/>
+              <a:t>Moving or renaming an item requires you to alter folders, </a:t>
+            </a:r>
+            <a:r>
+              <a:rPr lang="en-US" dirty="0" err="1" smtClean="0"/>
+              <a:t>folder_versions</a:t>
+            </a:r>
+            <a:r>
+              <a:rPr lang="en-US" dirty="0" smtClean="0"/>
+              <a:t>, and </a:t>
+            </a:r>
+            <a:r>
+              <a:rPr lang="en-US" dirty="0" err="1" smtClean="0"/>
+              <a:t>item_parents</a:t>
+            </a:r>
+            <a:r>
+              <a:rPr lang="en-US" dirty="0" smtClean="0"/>
+              <a:t>.</a:t>
+            </a:r>
+          </a:p>
+          <a:p>
+            <a:pPr lvl="1">
+              <a:buFont typeface="Wingdings" panose="05000000000000000000" pitchFamily="2" charset="2"/>
+              <a:buChar char="v"/>
+            </a:pPr>
+            <a:endParaRPr lang="en-US" dirty="0"/>
+          </a:p>
+          <a:p>
+            <a:pPr marL="201168" lvl="1" indent="0">
+              <a:buNone/>
+            </a:pPr>
+            <a:r>
+              <a:rPr lang="en-US" dirty="0" smtClean="0"/>
+              <a:t>OK! NOW</a:t>
+            </a:r>
+            <a:r>
+              <a:rPr lang="en-US" sz="4000" dirty="0" smtClean="0"/>
+              <a:t>TO the CODE!</a:t>
+            </a:r>
+            <a:endParaRPr lang="en-US" dirty="0"/>
+          </a:p>
+        </p:txBody>
+      </p:sp>
+    </p:spTree>
+    <p:extLst>
+      <p:ext uri="{BB962C8B-B14F-4D97-AF65-F5344CB8AC3E}">
+        <p14:creationId xmlns:p14="http://schemas.microsoft.com/office/powerpoint/2010/main" val="3679761740"/>
+      </p:ext>
+    </p:extLst>
+  </p:cSld>
+  <p:clrMapOvr>
+    <a:masterClrMapping/>
+  </p:clrMapOvr>
+</p:sld>
+</file>
+
 <file path=ppt/slides/slide2.xml><?xml version="1.0" encoding="utf-8"?>
 <p:sld xmlns:a="http://schemas.openxmlformats.org/drawingml/2006/main" xmlns:r="http://schemas.openxmlformats.org/officeDocument/2006/relationships" xmlns:p="http://schemas.openxmlformats.org/presentationml/2006/main">
   <p:cSld>
@@ -5495,15 +5695,7 @@
             </a:r>
             <a:r>
               <a:rPr lang="en-US" dirty="0" smtClean="0"/>
-              <a:t> is downloaded and set up, starting </a:t>
-            </a:r>
-            <a:r>
-              <a:rPr lang="en-US" dirty="0" smtClean="0"/>
-              <a:t>a single </a:t>
-            </a:r>
-            <a:r>
-              <a:rPr lang="en-US" dirty="0" smtClean="0"/>
-              <a:t>node Cassandra cluster is super easy:</a:t>
+              <a:t> is downloaded and set up, starting a single node Cassandra cluster is super easy:</a:t>
             </a:r>
           </a:p>
           <a:p>

</xml_diff>

<commit_message>
Added initial source code and begin work on test implementation.
</commit_message>
<xml_diff>
--- a/presentation/Scaling OpenSimulator Inventory using NoSQL.pptx
+++ b/presentation/Scaling OpenSimulator Inventory using NoSQL.pptx
@@ -349,7 +349,7 @@
           <a:p>
             <a:fld id="{4BDF68E2-58F2-4D09-BE8B-E3BD06533059}" type="datetimeFigureOut">
               <a:rPr lang="en-US" dirty="0"/>
-              <a:t>10/24/2014</a:t>
+              <a:t>10/27/2014</a:t>
             </a:fld>
             <a:endParaRPr lang="en-US" dirty="0"/>
           </a:p>
@@ -552,7 +552,7 @@
           <a:p>
             <a:fld id="{2E2D6473-DF6D-4702-B328-E0DD40540A4E}" type="datetimeFigureOut">
               <a:rPr lang="en-US" dirty="0"/>
-              <a:t>10/24/2014</a:t>
+              <a:t>10/27/2014</a:t>
             </a:fld>
             <a:endParaRPr lang="en-US" dirty="0"/>
           </a:p>
@@ -803,7 +803,7 @@
           <a:p>
             <a:fld id="{E26F7E3A-B166-407D-9866-32884E7D5B37}" type="datetimeFigureOut">
               <a:rPr lang="en-US" dirty="0"/>
-              <a:t>10/24/2014</a:t>
+              <a:t>10/27/2014</a:t>
             </a:fld>
             <a:endParaRPr lang="en-US" dirty="0"/>
           </a:p>
@@ -972,7 +972,7 @@
           <a:p>
             <a:fld id="{528FC5F6-F338-4AE4-BB23-26385BCFC423}" type="datetimeFigureOut">
               <a:rPr lang="en-US" dirty="0"/>
-              <a:t>10/24/2014</a:t>
+              <a:t>10/27/2014</a:t>
             </a:fld>
             <a:endParaRPr lang="en-US" dirty="0"/>
           </a:p>
@@ -1310,7 +1310,7 @@
           <a:p>
             <a:fld id="{20EBB0C4-6273-4C6E-B9BD-2EDC30F1CD52}" type="datetimeFigureOut">
               <a:rPr lang="en-US" dirty="0"/>
-              <a:t>10/24/2014</a:t>
+              <a:t>10/27/2014</a:t>
             </a:fld>
             <a:endParaRPr lang="en-US" dirty="0"/>
           </a:p>
@@ -1580,7 +1580,7 @@
           <a:p>
             <a:fld id="{19AB4D41-86C1-4908-B66A-0B50CEB3BF29}" type="datetimeFigureOut">
               <a:rPr lang="en-US" dirty="0"/>
-              <a:t>10/24/2014</a:t>
+              <a:t>10/27/2014</a:t>
             </a:fld>
             <a:endParaRPr lang="en-US" dirty="0"/>
           </a:p>
@@ -1954,7 +1954,7 @@
           <a:p>
             <a:fld id="{E6426E2C-56C1-4E0D-A793-0088A7FDD37E}" type="datetimeFigureOut">
               <a:rPr lang="en-US" dirty="0"/>
-              <a:t>10/24/2014</a:t>
+              <a:t>10/27/2014</a:t>
             </a:fld>
             <a:endParaRPr lang="en-US" dirty="0"/>
           </a:p>
@@ -2067,7 +2067,7 @@
           <a:p>
             <a:fld id="{C8C39B41-D8B5-4052-B551-9B5525EAA8B6}" type="datetimeFigureOut">
               <a:rPr lang="en-US" dirty="0"/>
-              <a:t>10/24/2014</a:t>
+              <a:t>10/27/2014</a:t>
             </a:fld>
             <a:endParaRPr lang="en-US" dirty="0"/>
           </a:p>
@@ -2233,7 +2233,7 @@
           <a:p>
             <a:fld id="{4D94136C-8742-45B2-AF27-D93DF72833A9}" type="datetimeFigureOut">
               <a:rPr lang="en-US" dirty="0"/>
-              <a:t>10/24/2014</a:t>
+              <a:t>10/27/2014</a:t>
             </a:fld>
             <a:endParaRPr lang="en-US" dirty="0"/>
           </a:p>
@@ -2583,7 +2583,7 @@
           <a:p>
             <a:fld id="{32ABBEA6-7C60-4B02-AE87-00D78D8422AF}" type="datetimeFigureOut">
               <a:rPr lang="en-US" dirty="0"/>
-              <a:t>10/24/2014</a:t>
+              <a:t>10/27/2014</a:t>
             </a:fld>
             <a:endParaRPr lang="en-US" dirty="0"/>
           </a:p>
@@ -2961,7 +2961,7 @@
           <a:p>
             <a:fld id="{C9CAD897-D46E-4AD2-BD9B-49DD3E640873}" type="datetimeFigureOut">
               <a:rPr lang="en-US" dirty="0"/>
-              <a:t>10/24/2014</a:t>
+              <a:t>10/27/2014</a:t>
             </a:fld>
             <a:endParaRPr lang="en-US" dirty="0"/>
           </a:p>
@@ -3243,7 +3243,7 @@
           <a:p>
             <a:fld id="{98624D31-43A5-475A-80CF-332C9F6DCF35}" type="datetimeFigureOut">
               <a:rPr lang="en-US" dirty="0"/>
-              <a:t>10/24/2014</a:t>
+              <a:t>10/27/2014</a:t>
             </a:fld>
             <a:endParaRPr lang="en-US" dirty="0"/>
           </a:p>
@@ -4344,6 +4344,54 @@
           </a:p>
         </p:txBody>
       </p:sp>
+      <p:pic>
+        <p:nvPicPr>
+          <p:cNvPr id="4" name="Picture 2" descr="http://planetcassandra.org/blogs/Upload/Post567/IW_R.png"/>
+          <p:cNvPicPr>
+            <a:picLocks noChangeAspect="1" noChangeArrowheads="1"/>
+          </p:cNvPicPr>
+          <p:nvPr/>
+        </p:nvPicPr>
+        <p:blipFill>
+          <a:blip r:embed="rId2">
+            <a:extLst>
+              <a:ext uri="{28A0092B-C50C-407E-A947-70E740481C1C}">
+                <a14:useLocalDpi xmlns:a14="http://schemas.microsoft.com/office/drawing/2010/main" val="0"/>
+              </a:ext>
+            </a:extLst>
+          </a:blip>
+          <a:srcRect/>
+          <a:stretch>
+            <a:fillRect/>
+          </a:stretch>
+        </p:blipFill>
+        <p:spPr bwMode="auto">
+          <a:xfrm>
+            <a:off x="10782554" y="0"/>
+            <a:ext cx="1409446" cy="1074426"/>
+          </a:xfrm>
+          <a:prstGeom prst="rect">
+            <a:avLst/>
+          </a:prstGeom>
+          <a:noFill/>
+          <a:effectLst>
+            <a:outerShdw blurRad="50800" dist="38100" algn="l" rotWithShape="0">
+              <a:prstClr val="black">
+                <a:alpha val="40000"/>
+              </a:prstClr>
+            </a:outerShdw>
+          </a:effectLst>
+          <a:extLst>
+            <a:ext uri="{909E8E84-426E-40DD-AFC4-6F175D3DCCD1}">
+              <a14:hiddenFill xmlns:a14="http://schemas.microsoft.com/office/drawing/2010/main">
+                <a:solidFill>
+                  <a:srgbClr val="FFFFFF"/>
+                </a:solidFill>
+              </a14:hiddenFill>
+            </a:ext>
+          </a:extLst>
+        </p:spPr>
+      </p:pic>
     </p:spTree>
     <p:extLst>
       <p:ext uri="{BB962C8B-B14F-4D97-AF65-F5344CB8AC3E}">
@@ -4550,6 +4598,54 @@
           </a:p>
         </p:txBody>
       </p:sp>
+      <p:pic>
+        <p:nvPicPr>
+          <p:cNvPr id="4" name="Picture 2" descr="http://planetcassandra.org/blogs/Upload/Post567/IW_R.png"/>
+          <p:cNvPicPr>
+            <a:picLocks noChangeAspect="1" noChangeArrowheads="1"/>
+          </p:cNvPicPr>
+          <p:nvPr/>
+        </p:nvPicPr>
+        <p:blipFill>
+          <a:blip r:embed="rId2">
+            <a:extLst>
+              <a:ext uri="{28A0092B-C50C-407E-A947-70E740481C1C}">
+                <a14:useLocalDpi xmlns:a14="http://schemas.microsoft.com/office/drawing/2010/main" val="0"/>
+              </a:ext>
+            </a:extLst>
+          </a:blip>
+          <a:srcRect/>
+          <a:stretch>
+            <a:fillRect/>
+          </a:stretch>
+        </p:blipFill>
+        <p:spPr bwMode="auto">
+          <a:xfrm>
+            <a:off x="10782554" y="0"/>
+            <a:ext cx="1409446" cy="1074426"/>
+          </a:xfrm>
+          <a:prstGeom prst="rect">
+            <a:avLst/>
+          </a:prstGeom>
+          <a:noFill/>
+          <a:effectLst>
+            <a:outerShdw blurRad="50800" dist="38100" algn="l" rotWithShape="0">
+              <a:prstClr val="black">
+                <a:alpha val="40000"/>
+              </a:prstClr>
+            </a:outerShdw>
+          </a:effectLst>
+          <a:extLst>
+            <a:ext uri="{909E8E84-426E-40DD-AFC4-6F175D3DCCD1}">
+              <a14:hiddenFill xmlns:a14="http://schemas.microsoft.com/office/drawing/2010/main">
+                <a:solidFill>
+                  <a:srgbClr val="FFFFFF"/>
+                </a:solidFill>
+              </a14:hiddenFill>
+            </a:ext>
+          </a:extLst>
+        </p:spPr>
+      </p:pic>
     </p:spTree>
     <p:extLst>
       <p:ext uri="{BB962C8B-B14F-4D97-AF65-F5344CB8AC3E}">

</xml_diff>

<commit_message>
Add the "who are you??" slide.
</commit_message>
<xml_diff>
--- a/presentation/Scaling OpenSimulator Inventory using NoSQL.pptx
+++ b/presentation/Scaling OpenSimulator Inventory using NoSQL.pptx
@@ -6,17 +6,18 @@
   </p:sldMasterIdLst>
   <p:sldIdLst>
     <p:sldId id="256" r:id="rId2"/>
-    <p:sldId id="257" r:id="rId3"/>
-    <p:sldId id="258" r:id="rId4"/>
-    <p:sldId id="259" r:id="rId5"/>
-    <p:sldId id="261" r:id="rId6"/>
-    <p:sldId id="260" r:id="rId7"/>
-    <p:sldId id="262" r:id="rId8"/>
-    <p:sldId id="263" r:id="rId9"/>
-    <p:sldId id="264" r:id="rId10"/>
-    <p:sldId id="265" r:id="rId11"/>
-    <p:sldId id="266" r:id="rId12"/>
-    <p:sldId id="267" r:id="rId13"/>
+    <p:sldId id="268" r:id="rId3"/>
+    <p:sldId id="257" r:id="rId4"/>
+    <p:sldId id="258" r:id="rId5"/>
+    <p:sldId id="259" r:id="rId6"/>
+    <p:sldId id="261" r:id="rId7"/>
+    <p:sldId id="260" r:id="rId8"/>
+    <p:sldId id="262" r:id="rId9"/>
+    <p:sldId id="263" r:id="rId10"/>
+    <p:sldId id="264" r:id="rId11"/>
+    <p:sldId id="265" r:id="rId12"/>
+    <p:sldId id="266" r:id="rId13"/>
+    <p:sldId id="267" r:id="rId14"/>
   </p:sldIdLst>
   <p:sldSz cx="12192000" cy="6858000"/>
   <p:notesSz cx="6858000" cy="9144000"/>
@@ -349,7 +350,7 @@
           <a:p>
             <a:fld id="{4BDF68E2-58F2-4D09-BE8B-E3BD06533059}" type="datetimeFigureOut">
               <a:rPr lang="en-US" dirty="0"/>
-              <a:t>10/27/2014</a:t>
+              <a:t>10/29/2014</a:t>
             </a:fld>
             <a:endParaRPr lang="en-US" dirty="0"/>
           </a:p>
@@ -552,7 +553,7 @@
           <a:p>
             <a:fld id="{2E2D6473-DF6D-4702-B328-E0DD40540A4E}" type="datetimeFigureOut">
               <a:rPr lang="en-US" dirty="0"/>
-              <a:t>10/27/2014</a:t>
+              <a:t>10/29/2014</a:t>
             </a:fld>
             <a:endParaRPr lang="en-US" dirty="0"/>
           </a:p>
@@ -803,7 +804,7 @@
           <a:p>
             <a:fld id="{E26F7E3A-B166-407D-9866-32884E7D5B37}" type="datetimeFigureOut">
               <a:rPr lang="en-US" dirty="0"/>
-              <a:t>10/27/2014</a:t>
+              <a:t>10/29/2014</a:t>
             </a:fld>
             <a:endParaRPr lang="en-US" dirty="0"/>
           </a:p>
@@ -972,7 +973,7 @@
           <a:p>
             <a:fld id="{528FC5F6-F338-4AE4-BB23-26385BCFC423}" type="datetimeFigureOut">
               <a:rPr lang="en-US" dirty="0"/>
-              <a:t>10/27/2014</a:t>
+              <a:t>10/29/2014</a:t>
             </a:fld>
             <a:endParaRPr lang="en-US" dirty="0"/>
           </a:p>
@@ -1310,7 +1311,7 @@
           <a:p>
             <a:fld id="{20EBB0C4-6273-4C6E-B9BD-2EDC30F1CD52}" type="datetimeFigureOut">
               <a:rPr lang="en-US" dirty="0"/>
-              <a:t>10/27/2014</a:t>
+              <a:t>10/29/2014</a:t>
             </a:fld>
             <a:endParaRPr lang="en-US" dirty="0"/>
           </a:p>
@@ -1580,7 +1581,7 @@
           <a:p>
             <a:fld id="{19AB4D41-86C1-4908-B66A-0B50CEB3BF29}" type="datetimeFigureOut">
               <a:rPr lang="en-US" dirty="0"/>
-              <a:t>10/27/2014</a:t>
+              <a:t>10/29/2014</a:t>
             </a:fld>
             <a:endParaRPr lang="en-US" dirty="0"/>
           </a:p>
@@ -1954,7 +1955,7 @@
           <a:p>
             <a:fld id="{E6426E2C-56C1-4E0D-A793-0088A7FDD37E}" type="datetimeFigureOut">
               <a:rPr lang="en-US" dirty="0"/>
-              <a:t>10/27/2014</a:t>
+              <a:t>10/29/2014</a:t>
             </a:fld>
             <a:endParaRPr lang="en-US" dirty="0"/>
           </a:p>
@@ -2067,7 +2068,7 @@
           <a:p>
             <a:fld id="{C8C39B41-D8B5-4052-B551-9B5525EAA8B6}" type="datetimeFigureOut">
               <a:rPr lang="en-US" dirty="0"/>
-              <a:t>10/27/2014</a:t>
+              <a:t>10/29/2014</a:t>
             </a:fld>
             <a:endParaRPr lang="en-US" dirty="0"/>
           </a:p>
@@ -2233,7 +2234,7 @@
           <a:p>
             <a:fld id="{4D94136C-8742-45B2-AF27-D93DF72833A9}" type="datetimeFigureOut">
               <a:rPr lang="en-US" dirty="0"/>
-              <a:t>10/27/2014</a:t>
+              <a:t>10/29/2014</a:t>
             </a:fld>
             <a:endParaRPr lang="en-US" dirty="0"/>
           </a:p>
@@ -2583,7 +2584,7 @@
           <a:p>
             <a:fld id="{32ABBEA6-7C60-4B02-AE87-00D78D8422AF}" type="datetimeFigureOut">
               <a:rPr lang="en-US" dirty="0"/>
-              <a:t>10/27/2014</a:t>
+              <a:t>10/29/2014</a:t>
             </a:fld>
             <a:endParaRPr lang="en-US" dirty="0"/>
           </a:p>
@@ -2961,7 +2962,7 @@
           <a:p>
             <a:fld id="{C9CAD897-D46E-4AD2-BD9B-49DD3E640873}" type="datetimeFigureOut">
               <a:rPr lang="en-US" dirty="0"/>
-              <a:t>10/27/2014</a:t>
+              <a:t>10/29/2014</a:t>
             </a:fld>
             <a:endParaRPr lang="en-US" dirty="0"/>
           </a:p>
@@ -3243,7 +3244,7 @@
           <a:p>
             <a:fld id="{98624D31-43A5-475A-80CF-332C9F6DCF35}" type="datetimeFigureOut">
               <a:rPr lang="en-US" dirty="0"/>
-              <a:t>10/27/2014</a:t>
+              <a:t>10/29/2014</a:t>
             </a:fld>
             <a:endParaRPr lang="en-US" dirty="0"/>
           </a:p>
@@ -3971,6 +3972,197 @@
           <a:p>
             <a:r>
               <a:rPr lang="en-US" dirty="0" smtClean="0"/>
+              <a:t>CQL Inventory schema design</a:t>
+            </a:r>
+            <a:endParaRPr lang="en-US" dirty="0"/>
+          </a:p>
+        </p:txBody>
+      </p:sp>
+      <p:sp>
+        <p:nvSpPr>
+          <p:cNvPr id="3" name="Content Placeholder 2"/>
+          <p:cNvSpPr>
+            <a:spLocks noGrp="1"/>
+          </p:cNvSpPr>
+          <p:nvPr>
+            <p:ph idx="1"/>
+          </p:nvPr>
+        </p:nvSpPr>
+        <p:spPr/>
+        <p:txBody>
+          <a:bodyPr/>
+          <a:lstStyle/>
+          <a:p>
+            <a:r>
+              <a:rPr lang="en-US" dirty="0" smtClean="0"/>
+              <a:t>Things to keep in mind:</a:t>
+            </a:r>
+          </a:p>
+          <a:p>
+            <a:pPr>
+              <a:buFont typeface="Wingdings" panose="05000000000000000000" pitchFamily="2" charset="2"/>
+              <a:buChar char="v"/>
+            </a:pPr>
+            <a:r>
+              <a:rPr lang="en-US" dirty="0" smtClean="0"/>
+              <a:t>SL based viewers don’t request subfolders individually in inventory fetch. The protocol CAN do this, but instead, all folders and subfolders are retrieved as part of the skeleton during login.</a:t>
+            </a:r>
+          </a:p>
+          <a:p>
+            <a:pPr>
+              <a:buFont typeface="Wingdings" panose="05000000000000000000" pitchFamily="2" charset="2"/>
+              <a:buChar char="v"/>
+            </a:pPr>
+            <a:r>
+              <a:rPr lang="en-US" dirty="0" smtClean="0"/>
+              <a:t>All items inside an individual folder are requested at once. We want to optimize reads based on this fact and not turn every item into an individual random IO. We can use a compound key to achieve this.</a:t>
+            </a:r>
+          </a:p>
+          <a:p>
+            <a:pPr>
+              <a:buFont typeface="Wingdings" panose="05000000000000000000" pitchFamily="2" charset="2"/>
+              <a:buChar char="v"/>
+            </a:pPr>
+            <a:r>
+              <a:rPr lang="en-US" dirty="0" smtClean="0"/>
+              <a:t>Items are </a:t>
+            </a:r>
+            <a:r>
+              <a:rPr lang="en-US" dirty="0" err="1" smtClean="0"/>
+              <a:t>rezzed</a:t>
+            </a:r>
+            <a:r>
+              <a:rPr lang="en-US" dirty="0" smtClean="0"/>
+              <a:t> into the world based on their UUID. Therefore we need to map item IDs back to their parent folder ID. We’ll do this explicitly and avoid secondary indexes which seem to have issues with becoming stale as of writing based on mailing list traffic.</a:t>
+            </a:r>
+          </a:p>
+          <a:p>
+            <a:pPr>
+              <a:buFont typeface="Wingdings" panose="05000000000000000000" pitchFamily="2" charset="2"/>
+              <a:buChar char="v"/>
+            </a:pPr>
+            <a:r>
+              <a:rPr lang="en-US" dirty="0" smtClean="0"/>
+              <a:t>All folders have version numbers that get incremented when items or subfolders and changed, created, moved, or deleted. We’ll use a special CQL column called a counter for this.</a:t>
+            </a:r>
+          </a:p>
+          <a:p>
+            <a:pPr>
+              <a:buFont typeface="Wingdings" panose="05000000000000000000" pitchFamily="2" charset="2"/>
+              <a:buChar char="v"/>
+            </a:pPr>
+            <a:endParaRPr lang="en-US" dirty="0" smtClean="0"/>
+          </a:p>
+          <a:p>
+            <a:pPr marL="0" indent="0">
+              <a:buNone/>
+            </a:pPr>
+            <a:endParaRPr lang="en-US" dirty="0"/>
+          </a:p>
+        </p:txBody>
+      </p:sp>
+      <p:pic>
+        <p:nvPicPr>
+          <p:cNvPr id="4" name="Picture 2" descr="http://planetcassandra.org/blogs/Upload/Post567/IW_R.png"/>
+          <p:cNvPicPr>
+            <a:picLocks noChangeAspect="1" noChangeArrowheads="1"/>
+          </p:cNvPicPr>
+          <p:nvPr/>
+        </p:nvPicPr>
+        <p:blipFill>
+          <a:blip r:embed="rId2">
+            <a:extLst>
+              <a:ext uri="{28A0092B-C50C-407E-A947-70E740481C1C}">
+                <a14:useLocalDpi xmlns:a14="http://schemas.microsoft.com/office/drawing/2010/main" val="0"/>
+              </a:ext>
+            </a:extLst>
+          </a:blip>
+          <a:srcRect/>
+          <a:stretch>
+            <a:fillRect/>
+          </a:stretch>
+        </p:blipFill>
+        <p:spPr bwMode="auto">
+          <a:xfrm>
+            <a:off x="10782554" y="0"/>
+            <a:ext cx="1409446" cy="1074426"/>
+          </a:xfrm>
+          <a:prstGeom prst="rect">
+            <a:avLst/>
+          </a:prstGeom>
+          <a:noFill/>
+          <a:effectLst>
+            <a:outerShdw blurRad="50800" dist="38100" algn="l" rotWithShape="0">
+              <a:prstClr val="black">
+                <a:alpha val="40000"/>
+              </a:prstClr>
+            </a:outerShdw>
+          </a:effectLst>
+          <a:extLst>
+            <a:ext uri="{909E8E84-426E-40DD-AFC4-6F175D3DCCD1}">
+              <a14:hiddenFill xmlns:a14="http://schemas.microsoft.com/office/drawing/2010/main">
+                <a:solidFill>
+                  <a:srgbClr val="FFFFFF"/>
+                </a:solidFill>
+              </a14:hiddenFill>
+            </a:ext>
+          </a:extLst>
+        </p:spPr>
+      </p:pic>
+    </p:spTree>
+    <p:extLst>
+      <p:ext uri="{BB962C8B-B14F-4D97-AF65-F5344CB8AC3E}">
+        <p14:creationId xmlns:p14="http://schemas.microsoft.com/office/powerpoint/2010/main" val="190458006"/>
+      </p:ext>
+    </p:extLst>
+  </p:cSld>
+  <p:clrMapOvr>
+    <a:masterClrMapping/>
+  </p:clrMapOvr>
+  <p:timing>
+    <p:tnLst>
+      <p:par>
+        <p:cTn id="1" dur="indefinite" restart="never" nodeType="tmRoot"/>
+      </p:par>
+    </p:tnLst>
+  </p:timing>
+</p:sld>
+</file>
+
+<file path=ppt/slides/slide11.xml><?xml version="1.0" encoding="utf-8"?>
+<p:sld xmlns:a="http://schemas.openxmlformats.org/drawingml/2006/main" xmlns:r="http://schemas.openxmlformats.org/officeDocument/2006/relationships" xmlns:p="http://schemas.openxmlformats.org/presentationml/2006/main">
+  <p:cSld>
+    <p:spTree>
+      <p:nvGrpSpPr>
+        <p:cNvPr id="1" name=""/>
+        <p:cNvGrpSpPr/>
+        <p:nvPr/>
+      </p:nvGrpSpPr>
+      <p:grpSpPr>
+        <a:xfrm>
+          <a:off x="0" y="0"/>
+          <a:ext cx="0" cy="0"/>
+          <a:chOff x="0" y="0"/>
+          <a:chExt cx="0" cy="0"/>
+        </a:xfrm>
+      </p:grpSpPr>
+      <p:sp>
+        <p:nvSpPr>
+          <p:cNvPr id="2" name="Title 1"/>
+          <p:cNvSpPr>
+            <a:spLocks noGrp="1"/>
+          </p:cNvSpPr>
+          <p:nvPr>
+            <p:ph type="title"/>
+          </p:nvPr>
+        </p:nvSpPr>
+        <p:spPr/>
+        <p:txBody>
+          <a:bodyPr/>
+          <a:lstStyle/>
+          <a:p>
+            <a:r>
+              <a:rPr lang="en-US" dirty="0" smtClean="0"/>
               <a:t>Our CQL Schema</a:t>
             </a:r>
             <a:endParaRPr lang="en-US" dirty="0"/>
@@ -4247,7 +4439,7 @@
 </p:sld>
 </file>
 
-<file path=ppt/slides/slide11.xml><?xml version="1.0" encoding="utf-8"?>
+<file path=ppt/slides/slide12.xml><?xml version="1.0" encoding="utf-8"?>
 <p:sld xmlns:a="http://schemas.openxmlformats.org/drawingml/2006/main" xmlns:r="http://schemas.openxmlformats.org/officeDocument/2006/relationships" xmlns:p="http://schemas.openxmlformats.org/presentationml/2006/main">
   <p:cSld>
     <p:spTree>
@@ -4412,7 +4604,7 @@
 </p:sld>
 </file>
 
-<file path=ppt/slides/slide12.xml><?xml version="1.0" encoding="utf-8"?>
+<file path=ppt/slides/slide13.xml><?xml version="1.0" encoding="utf-8"?>
 <p:sld xmlns:a="http://schemas.openxmlformats.org/drawingml/2006/main" xmlns:r="http://schemas.openxmlformats.org/officeDocument/2006/relationships" xmlns:p="http://schemas.openxmlformats.org/presentationml/2006/main">
   <p:cSld>
     <p:spTree>
@@ -4693,6 +4885,215 @@
           <a:p>
             <a:r>
               <a:rPr lang="en-US" dirty="0" smtClean="0"/>
+              <a:t>Who are you? Why should I watch? You’re not the boss of me!</a:t>
+            </a:r>
+            <a:endParaRPr lang="en-US" dirty="0"/>
+          </a:p>
+        </p:txBody>
+      </p:sp>
+      <p:sp>
+        <p:nvSpPr>
+          <p:cNvPr id="3" name="Content Placeholder 2"/>
+          <p:cNvSpPr>
+            <a:spLocks noGrp="1"/>
+          </p:cNvSpPr>
+          <p:nvPr>
+            <p:ph idx="1"/>
+          </p:nvPr>
+        </p:nvSpPr>
+        <p:spPr/>
+        <p:txBody>
+          <a:bodyPr>
+            <a:normAutofit fontScale="92500" lnSpcReduction="10000"/>
+          </a:bodyPr>
+          <a:lstStyle/>
+          <a:p>
+            <a:r>
+              <a:rPr lang="en-US" dirty="0" smtClean="0"/>
+              <a:t>Hello! I’m David Daeschler, also known as </a:t>
+            </a:r>
+            <a:r>
+              <a:rPr lang="en-US" dirty="0" err="1" smtClean="0"/>
+              <a:t>Tranquillity</a:t>
+            </a:r>
+            <a:r>
+              <a:rPr lang="en-US" dirty="0" smtClean="0"/>
+              <a:t> </a:t>
+            </a:r>
+            <a:r>
+              <a:rPr lang="en-US" dirty="0" err="1" smtClean="0"/>
+              <a:t>Dexler</a:t>
+            </a:r>
+            <a:r>
+              <a:rPr lang="en-US" dirty="0" smtClean="0"/>
+              <a:t>. I am a partner and software architect over at InWorldz, LLC.</a:t>
+            </a:r>
+          </a:p>
+          <a:p>
+            <a:pPr>
+              <a:buFont typeface="Wingdings" panose="05000000000000000000" pitchFamily="2" charset="2"/>
+              <a:buChar char="q"/>
+            </a:pPr>
+            <a:r>
+              <a:rPr lang="en-US" dirty="0" smtClean="0"/>
+              <a:t>I designed and deployed an LSL compiler, virtual machine, and script runtime named Phlox to eliminate CPU and memory issues caused by user scripts.</a:t>
+            </a:r>
+          </a:p>
+          <a:p>
+            <a:pPr>
+              <a:buFont typeface="Wingdings" panose="05000000000000000000" pitchFamily="2" charset="2"/>
+              <a:buChar char="q"/>
+            </a:pPr>
+            <a:r>
+              <a:rPr lang="en-US" dirty="0" smtClean="0"/>
+              <a:t>We developed PhysX physics integration for stable rigid body dynamics and vehicle functionality.</a:t>
+            </a:r>
+          </a:p>
+          <a:p>
+            <a:pPr>
+              <a:buFont typeface="Wingdings" panose="05000000000000000000" pitchFamily="2" charset="2"/>
+              <a:buChar char="q"/>
+            </a:pPr>
+            <a:r>
+              <a:rPr lang="en-US" dirty="0" smtClean="0"/>
+              <a:t>I’ve designed scale out asset services that now run over 11 servers (10 TB of data), and an inventory system running on top of Apache Cassandra that is now running on 8 nodes holding about 250 GB of data.</a:t>
+            </a:r>
+          </a:p>
+          <a:p>
+            <a:pPr>
+              <a:buFont typeface="Wingdings" panose="05000000000000000000" pitchFamily="2" charset="2"/>
+              <a:buChar char="q"/>
+            </a:pPr>
+            <a:r>
+              <a:rPr lang="en-US" dirty="0" smtClean="0"/>
+              <a:t>We routinely handle over 300 concurrent users on the grid and we’ve peaked out just shy of 500 concurrent users without experiencing backend faults or load issues.</a:t>
+            </a:r>
+          </a:p>
+          <a:p>
+            <a:pPr marL="0" indent="0">
+              <a:buNone/>
+            </a:pPr>
+            <a:r>
+              <a:rPr lang="en-US" dirty="0"/>
+              <a:t>We’ve experienced and conquered more than a few scaling problems while running our </a:t>
+            </a:r>
+            <a:r>
+              <a:rPr lang="en-US" dirty="0" err="1"/>
+              <a:t>Opensim</a:t>
+            </a:r>
+            <a:r>
+              <a:rPr lang="en-US" dirty="0"/>
+              <a:t> derived grid over the past 5 </a:t>
+            </a:r>
+            <a:r>
+              <a:rPr lang="en-US" dirty="0" smtClean="0"/>
+              <a:t>years. It’s been a school of hard knocks, and we’d like to share some of our experiences and solutions.</a:t>
+            </a:r>
+            <a:endParaRPr lang="en-US" dirty="0"/>
+          </a:p>
+          <a:p>
+            <a:pPr marL="0" indent="0">
+              <a:buNone/>
+            </a:pPr>
+            <a:endParaRPr lang="en-US" dirty="0"/>
+          </a:p>
+        </p:txBody>
+      </p:sp>
+      <p:pic>
+        <p:nvPicPr>
+          <p:cNvPr id="4" name="Picture 2" descr="http://planetcassandra.org/blogs/Upload/Post567/IW_R.png"/>
+          <p:cNvPicPr>
+            <a:picLocks noChangeAspect="1" noChangeArrowheads="1"/>
+          </p:cNvPicPr>
+          <p:nvPr/>
+        </p:nvPicPr>
+        <p:blipFill>
+          <a:blip r:embed="rId2">
+            <a:extLst>
+              <a:ext uri="{28A0092B-C50C-407E-A947-70E740481C1C}">
+                <a14:useLocalDpi xmlns:a14="http://schemas.microsoft.com/office/drawing/2010/main" val="0"/>
+              </a:ext>
+            </a:extLst>
+          </a:blip>
+          <a:srcRect/>
+          <a:stretch>
+            <a:fillRect/>
+          </a:stretch>
+        </p:blipFill>
+        <p:spPr bwMode="auto">
+          <a:xfrm>
+            <a:off x="10782554" y="0"/>
+            <a:ext cx="1409446" cy="1074426"/>
+          </a:xfrm>
+          <a:prstGeom prst="rect">
+            <a:avLst/>
+          </a:prstGeom>
+          <a:noFill/>
+          <a:effectLst>
+            <a:outerShdw blurRad="50800" dist="38100" algn="l" rotWithShape="0">
+              <a:prstClr val="black">
+                <a:alpha val="40000"/>
+              </a:prstClr>
+            </a:outerShdw>
+          </a:effectLst>
+          <a:extLst>
+            <a:ext uri="{909E8E84-426E-40DD-AFC4-6F175D3DCCD1}">
+              <a14:hiddenFill xmlns:a14="http://schemas.microsoft.com/office/drawing/2010/main">
+                <a:solidFill>
+                  <a:srgbClr val="FFFFFF"/>
+                </a:solidFill>
+              </a14:hiddenFill>
+            </a:ext>
+          </a:extLst>
+        </p:spPr>
+      </p:pic>
+    </p:spTree>
+    <p:extLst>
+      <p:ext uri="{BB962C8B-B14F-4D97-AF65-F5344CB8AC3E}">
+        <p14:creationId xmlns:p14="http://schemas.microsoft.com/office/powerpoint/2010/main" val="3861654251"/>
+      </p:ext>
+    </p:extLst>
+  </p:cSld>
+  <p:clrMapOvr>
+    <a:masterClrMapping/>
+  </p:clrMapOvr>
+</p:sld>
+</file>
+
+<file path=ppt/slides/slide3.xml><?xml version="1.0" encoding="utf-8"?>
+<p:sld xmlns:a="http://schemas.openxmlformats.org/drawingml/2006/main" xmlns:r="http://schemas.openxmlformats.org/officeDocument/2006/relationships" xmlns:p="http://schemas.openxmlformats.org/presentationml/2006/main">
+  <p:cSld>
+    <p:spTree>
+      <p:nvGrpSpPr>
+        <p:cNvPr id="1" name=""/>
+        <p:cNvGrpSpPr/>
+        <p:nvPr/>
+      </p:nvGrpSpPr>
+      <p:grpSpPr>
+        <a:xfrm>
+          <a:off x="0" y="0"/>
+          <a:ext cx="0" cy="0"/>
+          <a:chOff x="0" y="0"/>
+          <a:chExt cx="0" cy="0"/>
+        </a:xfrm>
+      </p:grpSpPr>
+      <p:sp>
+        <p:nvSpPr>
+          <p:cNvPr id="2" name="Title 1"/>
+          <p:cNvSpPr>
+            <a:spLocks noGrp="1"/>
+          </p:cNvSpPr>
+          <p:nvPr>
+            <p:ph type="title"/>
+          </p:nvPr>
+        </p:nvSpPr>
+        <p:spPr/>
+        <p:txBody>
+          <a:bodyPr/>
+          <a:lstStyle/>
+          <a:p>
+            <a:r>
+              <a:rPr lang="en-US" dirty="0" smtClean="0"/>
               <a:t>Oh noes! Inventory woes!</a:t>
             </a:r>
             <a:endParaRPr lang="en-US" dirty="0"/>
@@ -4875,7 +5276,7 @@
 </p:sld>
 </file>
 
-<file path=ppt/slides/slide3.xml><?xml version="1.0" encoding="utf-8"?>
+<file path=ppt/slides/slide4.xml><?xml version="1.0" encoding="utf-8"?>
 <p:sld xmlns:a="http://schemas.openxmlformats.org/drawingml/2006/main" xmlns:r="http://schemas.openxmlformats.org/officeDocument/2006/relationships" xmlns:p="http://schemas.openxmlformats.org/presentationml/2006/main">
   <p:cSld>
     <p:spTree>
@@ -5004,7 +5405,7 @@
 </p:sld>
 </file>
 
-<file path=ppt/slides/slide4.xml><?xml version="1.0" encoding="utf-8"?>
+<file path=ppt/slides/slide5.xml><?xml version="1.0" encoding="utf-8"?>
 <p:sld xmlns:a="http://schemas.openxmlformats.org/drawingml/2006/main" xmlns:r="http://schemas.openxmlformats.org/officeDocument/2006/relationships" xmlns:p="http://schemas.openxmlformats.org/presentationml/2006/main">
   <p:cSld>
     <p:spTree>
@@ -5148,7 +5549,7 @@
 </p:sld>
 </file>
 
-<file path=ppt/slides/slide5.xml><?xml version="1.0" encoding="utf-8"?>
+<file path=ppt/slides/slide6.xml><?xml version="1.0" encoding="utf-8"?>
 <p:sld xmlns:a="http://schemas.openxmlformats.org/drawingml/2006/main" xmlns:r="http://schemas.openxmlformats.org/officeDocument/2006/relationships" xmlns:p="http://schemas.openxmlformats.org/presentationml/2006/main">
   <p:cSld>
     <p:spTree>
@@ -5283,7 +5684,7 @@
 </p:sld>
 </file>
 
-<file path=ppt/slides/slide6.xml><?xml version="1.0" encoding="utf-8"?>
+<file path=ppt/slides/slide7.xml><?xml version="1.0" encoding="utf-8"?>
 <p:sld xmlns:a="http://schemas.openxmlformats.org/drawingml/2006/main" xmlns:r="http://schemas.openxmlformats.org/officeDocument/2006/relationships" xmlns:p="http://schemas.openxmlformats.org/presentationml/2006/main">
   <p:cSld>
     <p:spTree>
@@ -5647,7 +6048,7 @@
 </p:sld>
 </file>
 
-<file path=ppt/slides/slide7.xml><?xml version="1.0" encoding="utf-8"?>
+<file path=ppt/slides/slide8.xml><?xml version="1.0" encoding="utf-8"?>
 <p:sld xmlns:a="http://schemas.openxmlformats.org/drawingml/2006/main" xmlns:r="http://schemas.openxmlformats.org/officeDocument/2006/relationships" xmlns:p="http://schemas.openxmlformats.org/presentationml/2006/main">
   <p:cSld>
     <p:spTree>
@@ -5923,7 +6324,7 @@
 </p:sld>
 </file>
 
-<file path=ppt/slides/slide8.xml><?xml version="1.0" encoding="utf-8"?>
+<file path=ppt/slides/slide9.xml><?xml version="1.0" encoding="utf-8"?>
 <p:sld xmlns:a="http://schemas.openxmlformats.org/drawingml/2006/main" xmlns:r="http://schemas.openxmlformats.org/officeDocument/2006/relationships" xmlns:p="http://schemas.openxmlformats.org/presentationml/2006/main">
   <p:cSld>
     <p:spTree>
@@ -6100,197 +6501,6 @@
     <p:extLst>
       <p:ext uri="{BB962C8B-B14F-4D97-AF65-F5344CB8AC3E}">
         <p14:creationId xmlns:p14="http://schemas.microsoft.com/office/powerpoint/2010/main" val="2598162185"/>
-      </p:ext>
-    </p:extLst>
-  </p:cSld>
-  <p:clrMapOvr>
-    <a:masterClrMapping/>
-  </p:clrMapOvr>
-  <p:timing>
-    <p:tnLst>
-      <p:par>
-        <p:cTn id="1" dur="indefinite" restart="never" nodeType="tmRoot"/>
-      </p:par>
-    </p:tnLst>
-  </p:timing>
-</p:sld>
-</file>
-
-<file path=ppt/slides/slide9.xml><?xml version="1.0" encoding="utf-8"?>
-<p:sld xmlns:a="http://schemas.openxmlformats.org/drawingml/2006/main" xmlns:r="http://schemas.openxmlformats.org/officeDocument/2006/relationships" xmlns:p="http://schemas.openxmlformats.org/presentationml/2006/main">
-  <p:cSld>
-    <p:spTree>
-      <p:nvGrpSpPr>
-        <p:cNvPr id="1" name=""/>
-        <p:cNvGrpSpPr/>
-        <p:nvPr/>
-      </p:nvGrpSpPr>
-      <p:grpSpPr>
-        <a:xfrm>
-          <a:off x="0" y="0"/>
-          <a:ext cx="0" cy="0"/>
-          <a:chOff x="0" y="0"/>
-          <a:chExt cx="0" cy="0"/>
-        </a:xfrm>
-      </p:grpSpPr>
-      <p:sp>
-        <p:nvSpPr>
-          <p:cNvPr id="2" name="Title 1"/>
-          <p:cNvSpPr>
-            <a:spLocks noGrp="1"/>
-          </p:cNvSpPr>
-          <p:nvPr>
-            <p:ph type="title"/>
-          </p:nvPr>
-        </p:nvSpPr>
-        <p:spPr/>
-        <p:txBody>
-          <a:bodyPr/>
-          <a:lstStyle/>
-          <a:p>
-            <a:r>
-              <a:rPr lang="en-US" dirty="0" smtClean="0"/>
-              <a:t>CQL Inventory schema design</a:t>
-            </a:r>
-            <a:endParaRPr lang="en-US" dirty="0"/>
-          </a:p>
-        </p:txBody>
-      </p:sp>
-      <p:sp>
-        <p:nvSpPr>
-          <p:cNvPr id="3" name="Content Placeholder 2"/>
-          <p:cNvSpPr>
-            <a:spLocks noGrp="1"/>
-          </p:cNvSpPr>
-          <p:nvPr>
-            <p:ph idx="1"/>
-          </p:nvPr>
-        </p:nvSpPr>
-        <p:spPr/>
-        <p:txBody>
-          <a:bodyPr/>
-          <a:lstStyle/>
-          <a:p>
-            <a:r>
-              <a:rPr lang="en-US" dirty="0" smtClean="0"/>
-              <a:t>Things to keep in mind:</a:t>
-            </a:r>
-          </a:p>
-          <a:p>
-            <a:pPr>
-              <a:buFont typeface="Wingdings" panose="05000000000000000000" pitchFamily="2" charset="2"/>
-              <a:buChar char="v"/>
-            </a:pPr>
-            <a:r>
-              <a:rPr lang="en-US" dirty="0" smtClean="0"/>
-              <a:t>SL based viewers don’t request subfolders individually in inventory fetch. The protocol CAN do this, but instead, all folders and subfolders are retrieved as part of the skeleton during login.</a:t>
-            </a:r>
-          </a:p>
-          <a:p>
-            <a:pPr>
-              <a:buFont typeface="Wingdings" panose="05000000000000000000" pitchFamily="2" charset="2"/>
-              <a:buChar char="v"/>
-            </a:pPr>
-            <a:r>
-              <a:rPr lang="en-US" dirty="0" smtClean="0"/>
-              <a:t>All items inside an individual folder are requested at once. We want to optimize reads based on this fact and not turn every item into an individual random IO. We can use a compound key to achieve this.</a:t>
-            </a:r>
-          </a:p>
-          <a:p>
-            <a:pPr>
-              <a:buFont typeface="Wingdings" panose="05000000000000000000" pitchFamily="2" charset="2"/>
-              <a:buChar char="v"/>
-            </a:pPr>
-            <a:r>
-              <a:rPr lang="en-US" dirty="0" smtClean="0"/>
-              <a:t>Items are </a:t>
-            </a:r>
-            <a:r>
-              <a:rPr lang="en-US" dirty="0" err="1" smtClean="0"/>
-              <a:t>rezzed</a:t>
-            </a:r>
-            <a:r>
-              <a:rPr lang="en-US" dirty="0" smtClean="0"/>
-              <a:t> into the world based on their UUID. Therefore we need to map item IDs back to their parent folder ID. We’ll do this explicitly and avoid secondary indexes which seem to have issues with becoming stale as of writing based on mailing list traffic.</a:t>
-            </a:r>
-          </a:p>
-          <a:p>
-            <a:pPr>
-              <a:buFont typeface="Wingdings" panose="05000000000000000000" pitchFamily="2" charset="2"/>
-              <a:buChar char="v"/>
-            </a:pPr>
-            <a:r>
-              <a:rPr lang="en-US" dirty="0" smtClean="0"/>
-              <a:t>All folders have version numbers that get incremented when items or subfolders and changed, created, moved, or deleted. We’ll use a special CQL column called a counter for this.</a:t>
-            </a:r>
-          </a:p>
-          <a:p>
-            <a:pPr>
-              <a:buFont typeface="Wingdings" panose="05000000000000000000" pitchFamily="2" charset="2"/>
-              <a:buChar char="v"/>
-            </a:pPr>
-            <a:endParaRPr lang="en-US" dirty="0" smtClean="0"/>
-          </a:p>
-          <a:p>
-            <a:pPr marL="0" indent="0">
-              <a:buNone/>
-            </a:pPr>
-            <a:endParaRPr lang="en-US" dirty="0"/>
-          </a:p>
-        </p:txBody>
-      </p:sp>
-      <p:pic>
-        <p:nvPicPr>
-          <p:cNvPr id="4" name="Picture 2" descr="http://planetcassandra.org/blogs/Upload/Post567/IW_R.png"/>
-          <p:cNvPicPr>
-            <a:picLocks noChangeAspect="1" noChangeArrowheads="1"/>
-          </p:cNvPicPr>
-          <p:nvPr/>
-        </p:nvPicPr>
-        <p:blipFill>
-          <a:blip r:embed="rId2">
-            <a:extLst>
-              <a:ext uri="{28A0092B-C50C-407E-A947-70E740481C1C}">
-                <a14:useLocalDpi xmlns:a14="http://schemas.microsoft.com/office/drawing/2010/main" val="0"/>
-              </a:ext>
-            </a:extLst>
-          </a:blip>
-          <a:srcRect/>
-          <a:stretch>
-            <a:fillRect/>
-          </a:stretch>
-        </p:blipFill>
-        <p:spPr bwMode="auto">
-          <a:xfrm>
-            <a:off x="10782554" y="0"/>
-            <a:ext cx="1409446" cy="1074426"/>
-          </a:xfrm>
-          <a:prstGeom prst="rect">
-            <a:avLst/>
-          </a:prstGeom>
-          <a:noFill/>
-          <a:effectLst>
-            <a:outerShdw blurRad="50800" dist="38100" algn="l" rotWithShape="0">
-              <a:prstClr val="black">
-                <a:alpha val="40000"/>
-              </a:prstClr>
-            </a:outerShdw>
-          </a:effectLst>
-          <a:extLst>
-            <a:ext uri="{909E8E84-426E-40DD-AFC4-6F175D3DCCD1}">
-              <a14:hiddenFill xmlns:a14="http://schemas.microsoft.com/office/drawing/2010/main">
-                <a:solidFill>
-                  <a:srgbClr val="FFFFFF"/>
-                </a:solidFill>
-              </a14:hiddenFill>
-            </a:ext>
-          </a:extLst>
-        </p:spPr>
-      </p:pic>
-    </p:spTree>
-    <p:extLst>
-      <p:ext uri="{BB962C8B-B14F-4D97-AF65-F5344CB8AC3E}">
-        <p14:creationId xmlns:p14="http://schemas.microsoft.com/office/powerpoint/2010/main" val="190458006"/>
       </p:ext>
     </p:extLst>
   </p:cSld>

</xml_diff>

<commit_message>
Add a slide regarding eventual consistency
</commit_message>
<xml_diff>
--- a/presentation/Scaling OpenSimulator Inventory using NoSQL.pptx
+++ b/presentation/Scaling OpenSimulator Inventory using NoSQL.pptx
@@ -12,12 +12,13 @@
     <p:sldId id="259" r:id="rId6"/>
     <p:sldId id="261" r:id="rId7"/>
     <p:sldId id="260" r:id="rId8"/>
-    <p:sldId id="262" r:id="rId9"/>
-    <p:sldId id="263" r:id="rId10"/>
-    <p:sldId id="264" r:id="rId11"/>
-    <p:sldId id="265" r:id="rId12"/>
-    <p:sldId id="266" r:id="rId13"/>
-    <p:sldId id="267" r:id="rId14"/>
+    <p:sldId id="269" r:id="rId9"/>
+    <p:sldId id="262" r:id="rId10"/>
+    <p:sldId id="263" r:id="rId11"/>
+    <p:sldId id="264" r:id="rId12"/>
+    <p:sldId id="265" r:id="rId13"/>
+    <p:sldId id="266" r:id="rId14"/>
+    <p:sldId id="267" r:id="rId15"/>
   </p:sldIdLst>
   <p:sldSz cx="12192000" cy="6858000"/>
   <p:notesSz cx="6858000" cy="9144000"/>
@@ -350,7 +351,7 @@
           <a:p>
             <a:fld id="{4BDF68E2-58F2-4D09-BE8B-E3BD06533059}" type="datetimeFigureOut">
               <a:rPr lang="en-US" dirty="0"/>
-              <a:t>10/29/2014</a:t>
+              <a:t>11/3/2014</a:t>
             </a:fld>
             <a:endParaRPr lang="en-US" dirty="0"/>
           </a:p>
@@ -553,7 +554,7 @@
           <a:p>
             <a:fld id="{2E2D6473-DF6D-4702-B328-E0DD40540A4E}" type="datetimeFigureOut">
               <a:rPr lang="en-US" dirty="0"/>
-              <a:t>10/29/2014</a:t>
+              <a:t>11/3/2014</a:t>
             </a:fld>
             <a:endParaRPr lang="en-US" dirty="0"/>
           </a:p>
@@ -804,7 +805,7 @@
           <a:p>
             <a:fld id="{E26F7E3A-B166-407D-9866-32884E7D5B37}" type="datetimeFigureOut">
               <a:rPr lang="en-US" dirty="0"/>
-              <a:t>10/29/2014</a:t>
+              <a:t>11/3/2014</a:t>
             </a:fld>
             <a:endParaRPr lang="en-US" dirty="0"/>
           </a:p>
@@ -973,7 +974,7 @@
           <a:p>
             <a:fld id="{528FC5F6-F338-4AE4-BB23-26385BCFC423}" type="datetimeFigureOut">
               <a:rPr lang="en-US" dirty="0"/>
-              <a:t>10/29/2014</a:t>
+              <a:t>11/3/2014</a:t>
             </a:fld>
             <a:endParaRPr lang="en-US" dirty="0"/>
           </a:p>
@@ -1311,7 +1312,7 @@
           <a:p>
             <a:fld id="{20EBB0C4-6273-4C6E-B9BD-2EDC30F1CD52}" type="datetimeFigureOut">
               <a:rPr lang="en-US" dirty="0"/>
-              <a:t>10/29/2014</a:t>
+              <a:t>11/3/2014</a:t>
             </a:fld>
             <a:endParaRPr lang="en-US" dirty="0"/>
           </a:p>
@@ -1581,7 +1582,7 @@
           <a:p>
             <a:fld id="{19AB4D41-86C1-4908-B66A-0B50CEB3BF29}" type="datetimeFigureOut">
               <a:rPr lang="en-US" dirty="0"/>
-              <a:t>10/29/2014</a:t>
+              <a:t>11/3/2014</a:t>
             </a:fld>
             <a:endParaRPr lang="en-US" dirty="0"/>
           </a:p>
@@ -1955,7 +1956,7 @@
           <a:p>
             <a:fld id="{E6426E2C-56C1-4E0D-A793-0088A7FDD37E}" type="datetimeFigureOut">
               <a:rPr lang="en-US" dirty="0"/>
-              <a:t>10/29/2014</a:t>
+              <a:t>11/3/2014</a:t>
             </a:fld>
             <a:endParaRPr lang="en-US" dirty="0"/>
           </a:p>
@@ -2068,7 +2069,7 @@
           <a:p>
             <a:fld id="{C8C39B41-D8B5-4052-B551-9B5525EAA8B6}" type="datetimeFigureOut">
               <a:rPr lang="en-US" dirty="0"/>
-              <a:t>10/29/2014</a:t>
+              <a:t>11/3/2014</a:t>
             </a:fld>
             <a:endParaRPr lang="en-US" dirty="0"/>
           </a:p>
@@ -2234,7 +2235,7 @@
           <a:p>
             <a:fld id="{4D94136C-8742-45B2-AF27-D93DF72833A9}" type="datetimeFigureOut">
               <a:rPr lang="en-US" dirty="0"/>
-              <a:t>10/29/2014</a:t>
+              <a:t>11/3/2014</a:t>
             </a:fld>
             <a:endParaRPr lang="en-US" dirty="0"/>
           </a:p>
@@ -2584,7 +2585,7 @@
           <a:p>
             <a:fld id="{32ABBEA6-7C60-4B02-AE87-00D78D8422AF}" type="datetimeFigureOut">
               <a:rPr lang="en-US" dirty="0"/>
-              <a:t>10/29/2014</a:t>
+              <a:t>11/3/2014</a:t>
             </a:fld>
             <a:endParaRPr lang="en-US" dirty="0"/>
           </a:p>
@@ -2962,7 +2963,7 @@
           <a:p>
             <a:fld id="{C9CAD897-D46E-4AD2-BD9B-49DD3E640873}" type="datetimeFigureOut">
               <a:rPr lang="en-US" dirty="0"/>
-              <a:t>10/29/2014</a:t>
+              <a:t>11/3/2014</a:t>
             </a:fld>
             <a:endParaRPr lang="en-US" dirty="0"/>
           </a:p>
@@ -3244,7 +3245,7 @@
           <a:p>
             <a:fld id="{98624D31-43A5-475A-80CF-332C9F6DCF35}" type="datetimeFigureOut">
               <a:rPr lang="en-US" dirty="0"/>
-              <a:t>10/29/2014</a:t>
+              <a:t>11/3/2014</a:t>
             </a:fld>
             <a:endParaRPr lang="en-US" dirty="0"/>
           </a:p>
@@ -3972,6 +3973,199 @@
           <a:p>
             <a:r>
               <a:rPr lang="en-US" dirty="0" smtClean="0"/>
+              <a:t>CQL: Like SQL but different</a:t>
+            </a:r>
+            <a:endParaRPr lang="en-US" dirty="0"/>
+          </a:p>
+        </p:txBody>
+      </p:sp>
+      <p:sp>
+        <p:nvSpPr>
+          <p:cNvPr id="3" name="Content Placeholder 2"/>
+          <p:cNvSpPr>
+            <a:spLocks noGrp="1"/>
+          </p:cNvSpPr>
+          <p:nvPr>
+            <p:ph idx="1"/>
+          </p:nvPr>
+        </p:nvSpPr>
+        <p:spPr/>
+        <p:txBody>
+          <a:bodyPr/>
+          <a:lstStyle/>
+          <a:p>
+            <a:r>
+              <a:rPr lang="en-US" dirty="0" smtClean="0"/>
+              <a:t>Originally when Cassandra made its debut, the only way to get at the data was to use Thrift calls that pulled and updated columns very much like working with a hash set.</a:t>
+            </a:r>
+          </a:p>
+          <a:p>
+            <a:r>
+              <a:rPr lang="en-US" dirty="0" smtClean="0"/>
+              <a:t>Cassandra then developed CQL (Cassandra Query Language) which is a familiar cousin of SQL with the following notable exceptions:</a:t>
+            </a:r>
+          </a:p>
+          <a:p>
+            <a:pPr>
+              <a:buFont typeface="Wingdings" panose="05000000000000000000" pitchFamily="2" charset="2"/>
+              <a:buChar char="q"/>
+            </a:pPr>
+            <a:r>
+              <a:rPr lang="en-US" dirty="0" smtClean="0"/>
+              <a:t>No joins. No GROUP BY. Data in Cassandra is expected to be mostly </a:t>
+            </a:r>
+            <a:r>
+              <a:rPr lang="en-US" dirty="0" err="1" smtClean="0"/>
+              <a:t>denormalized</a:t>
+            </a:r>
+            <a:r>
+              <a:rPr lang="en-US" dirty="0" smtClean="0"/>
+              <a:t>. Cassandra writes are extremely fast, faster than reads, which mitigates the extra write penalty.</a:t>
+            </a:r>
+          </a:p>
+          <a:p>
+            <a:pPr>
+              <a:buFont typeface="Wingdings" panose="05000000000000000000" pitchFamily="2" charset="2"/>
+              <a:buChar char="q"/>
+            </a:pPr>
+            <a:r>
+              <a:rPr lang="en-US" dirty="0" smtClean="0"/>
+              <a:t>Cassandra supports compound keys and data that has the data grouped together by the partition key (</a:t>
+            </a:r>
+            <a:r>
+              <a:rPr lang="en-US" b="1" dirty="0" smtClean="0"/>
+              <a:t>important! </a:t>
+            </a:r>
+            <a:r>
+              <a:rPr lang="en-US" dirty="0" smtClean="0"/>
+              <a:t>more on this later)</a:t>
+            </a:r>
+          </a:p>
+          <a:p>
+            <a:pPr>
+              <a:buFont typeface="Wingdings" panose="05000000000000000000" pitchFamily="2" charset="2"/>
+              <a:buChar char="q"/>
+            </a:pPr>
+            <a:r>
+              <a:rPr lang="en-US" dirty="0" smtClean="0"/>
+              <a:t>You can not use a WHERE clause to filter on columns that aren’t part of the row key or a secondary index.  Partition keys must be queried using the = operator or IN statements.</a:t>
+            </a:r>
+          </a:p>
+          <a:p>
+            <a:pPr>
+              <a:buFont typeface="Wingdings" panose="05000000000000000000" pitchFamily="2" charset="2"/>
+              <a:buChar char="q"/>
+            </a:pPr>
+            <a:r>
+              <a:rPr lang="en-US" dirty="0" smtClean="0"/>
+              <a:t>These rules and features keep you from shooting yourself in the foot.</a:t>
+            </a:r>
+            <a:endParaRPr lang="en-US" dirty="0"/>
+          </a:p>
+        </p:txBody>
+      </p:sp>
+      <p:pic>
+        <p:nvPicPr>
+          <p:cNvPr id="4" name="Picture 2" descr="http://planetcassandra.org/blogs/Upload/Post567/IW_R.png"/>
+          <p:cNvPicPr>
+            <a:picLocks noChangeAspect="1" noChangeArrowheads="1"/>
+          </p:cNvPicPr>
+          <p:nvPr/>
+        </p:nvPicPr>
+        <p:blipFill>
+          <a:blip r:embed="rId2">
+            <a:extLst>
+              <a:ext uri="{28A0092B-C50C-407E-A947-70E740481C1C}">
+                <a14:useLocalDpi xmlns:a14="http://schemas.microsoft.com/office/drawing/2010/main" val="0"/>
+              </a:ext>
+            </a:extLst>
+          </a:blip>
+          <a:srcRect/>
+          <a:stretch>
+            <a:fillRect/>
+          </a:stretch>
+        </p:blipFill>
+        <p:spPr bwMode="auto">
+          <a:xfrm>
+            <a:off x="10782554" y="0"/>
+            <a:ext cx="1409446" cy="1074426"/>
+          </a:xfrm>
+          <a:prstGeom prst="rect">
+            <a:avLst/>
+          </a:prstGeom>
+          <a:noFill/>
+          <a:effectLst>
+            <a:outerShdw blurRad="50800" dist="38100" algn="l" rotWithShape="0">
+              <a:prstClr val="black">
+                <a:alpha val="40000"/>
+              </a:prstClr>
+            </a:outerShdw>
+          </a:effectLst>
+          <a:extLst>
+            <a:ext uri="{909E8E84-426E-40DD-AFC4-6F175D3DCCD1}">
+              <a14:hiddenFill xmlns:a14="http://schemas.microsoft.com/office/drawing/2010/main">
+                <a:solidFill>
+                  <a:srgbClr val="FFFFFF"/>
+                </a:solidFill>
+              </a14:hiddenFill>
+            </a:ext>
+          </a:extLst>
+        </p:spPr>
+      </p:pic>
+    </p:spTree>
+    <p:extLst>
+      <p:ext uri="{BB962C8B-B14F-4D97-AF65-F5344CB8AC3E}">
+        <p14:creationId xmlns:p14="http://schemas.microsoft.com/office/powerpoint/2010/main" val="2598162185"/>
+      </p:ext>
+    </p:extLst>
+  </p:cSld>
+  <p:clrMapOvr>
+    <a:masterClrMapping/>
+  </p:clrMapOvr>
+  <p:timing>
+    <p:tnLst>
+      <p:par>
+        <p:cTn id="1" dur="indefinite" restart="never" nodeType="tmRoot"/>
+      </p:par>
+    </p:tnLst>
+  </p:timing>
+</p:sld>
+</file>
+
+<file path=ppt/slides/slide11.xml><?xml version="1.0" encoding="utf-8"?>
+<p:sld xmlns:a="http://schemas.openxmlformats.org/drawingml/2006/main" xmlns:r="http://schemas.openxmlformats.org/officeDocument/2006/relationships" xmlns:p="http://schemas.openxmlformats.org/presentationml/2006/main">
+  <p:cSld>
+    <p:spTree>
+      <p:nvGrpSpPr>
+        <p:cNvPr id="1" name=""/>
+        <p:cNvGrpSpPr/>
+        <p:nvPr/>
+      </p:nvGrpSpPr>
+      <p:grpSpPr>
+        <a:xfrm>
+          <a:off x="0" y="0"/>
+          <a:ext cx="0" cy="0"/>
+          <a:chOff x="0" y="0"/>
+          <a:chExt cx="0" cy="0"/>
+        </a:xfrm>
+      </p:grpSpPr>
+      <p:sp>
+        <p:nvSpPr>
+          <p:cNvPr id="2" name="Title 1"/>
+          <p:cNvSpPr>
+            <a:spLocks noGrp="1"/>
+          </p:cNvSpPr>
+          <p:nvPr>
+            <p:ph type="title"/>
+          </p:nvPr>
+        </p:nvSpPr>
+        <p:spPr/>
+        <p:txBody>
+          <a:bodyPr/>
+          <a:lstStyle/>
+          <a:p>
+            <a:r>
+              <a:rPr lang="en-US" dirty="0" smtClean="0"/>
               <a:t>CQL Inventory schema design</a:t>
             </a:r>
             <a:endParaRPr lang="en-US" dirty="0"/>
@@ -4129,7 +4323,7 @@
 </p:sld>
 </file>
 
-<file path=ppt/slides/slide11.xml><?xml version="1.0" encoding="utf-8"?>
+<file path=ppt/slides/slide12.xml><?xml version="1.0" encoding="utf-8"?>
 <p:sld xmlns:a="http://schemas.openxmlformats.org/drawingml/2006/main" xmlns:r="http://schemas.openxmlformats.org/officeDocument/2006/relationships" xmlns:p="http://schemas.openxmlformats.org/presentationml/2006/main">
   <p:cSld>
     <p:spTree>
@@ -4439,7 +4633,7 @@
 </p:sld>
 </file>
 
-<file path=ppt/slides/slide12.xml><?xml version="1.0" encoding="utf-8"?>
+<file path=ppt/slides/slide13.xml><?xml version="1.0" encoding="utf-8"?>
 <p:sld xmlns:a="http://schemas.openxmlformats.org/drawingml/2006/main" xmlns:r="http://schemas.openxmlformats.org/officeDocument/2006/relationships" xmlns:p="http://schemas.openxmlformats.org/presentationml/2006/main">
   <p:cSld>
     <p:spTree>
@@ -4604,7 +4798,7 @@
 </p:sld>
 </file>
 
-<file path=ppt/slides/slide13.xml><?xml version="1.0" encoding="utf-8"?>
+<file path=ppt/slides/slide14.xml><?xml version="1.0" encoding="utf-8"?>
 <p:sld xmlns:a="http://schemas.openxmlformats.org/drawingml/2006/main" xmlns:r="http://schemas.openxmlformats.org/officeDocument/2006/relationships" xmlns:p="http://schemas.openxmlformats.org/presentationml/2006/main">
   <p:cSld>
     <p:spTree>
@@ -6082,6 +6276,121 @@
           <a:p>
             <a:r>
               <a:rPr lang="en-US" dirty="0" smtClean="0"/>
+              <a:t>But WAIT! Cassandra is eventually consistent! What about ACID?!</a:t>
+            </a:r>
+            <a:endParaRPr lang="en-US" dirty="0"/>
+          </a:p>
+        </p:txBody>
+      </p:sp>
+      <p:sp>
+        <p:nvSpPr>
+          <p:cNvPr id="3" name="Content Placeholder 2"/>
+          <p:cNvSpPr>
+            <a:spLocks noGrp="1"/>
+          </p:cNvSpPr>
+          <p:nvPr>
+            <p:ph idx="1"/>
+          </p:nvPr>
+        </p:nvSpPr>
+        <p:spPr/>
+        <p:txBody>
+          <a:bodyPr>
+            <a:normAutofit/>
+          </a:bodyPr>
+          <a:lstStyle/>
+          <a:p>
+            <a:r>
+              <a:rPr lang="en-US" dirty="0" smtClean="0"/>
+              <a:t>I’d hate to break it to you, but a traditional RDBMS scale out solution with a single master and one or more slaves is also eventually consistent.</a:t>
+            </a:r>
+          </a:p>
+          <a:p>
+            <a:r>
+              <a:rPr lang="en-US" b="1" dirty="0" smtClean="0"/>
+              <a:t>“LIES!” you say</a:t>
+            </a:r>
+            <a:r>
+              <a:rPr lang="en-US" dirty="0" smtClean="0"/>
+              <a:t>. No, seriously. There’s this metric that you can query in a MySQL setup called slave lag. This number tells you exactly how far behind a slave is from its master. The slave will never be exactly up to date with the </a:t>
+            </a:r>
+            <a:r>
+              <a:rPr lang="en-US" dirty="0" smtClean="0"/>
+              <a:t>master as long as it is taking constant writes, </a:t>
+            </a:r>
+            <a:r>
+              <a:rPr lang="en-US" dirty="0" smtClean="0"/>
+              <a:t>and reading from it may return results that are </a:t>
+            </a:r>
+            <a:r>
+              <a:rPr lang="en-US" dirty="0" smtClean="0"/>
+              <a:t>from </a:t>
+            </a:r>
+            <a:r>
+              <a:rPr lang="en-US" dirty="0" smtClean="0"/>
+              <a:t>in the past</a:t>
+            </a:r>
+            <a:r>
+              <a:rPr lang="en-US" dirty="0" smtClean="0"/>
+              <a:t>. Application designers need to keep this in mind as much as they need to understand Cassandra’s eventual consistency.</a:t>
+            </a:r>
+            <a:endParaRPr lang="en-US" dirty="0" smtClean="0"/>
+          </a:p>
+          <a:p>
+            <a:r>
+              <a:rPr lang="en-US" dirty="0" smtClean="0"/>
+              <a:t>It turns out that Cassandra has tunable consistency and can offer better guarantees to obtain a consistent read than traditional scale out on an RDBMS. This is because we can tell Cassandra to write to a set of nodes, and not return until a quorum of them have responded that they have written the new value. When we again read at quorum consistency, we are guaranteed to see the most up to date value!</a:t>
+            </a:r>
+            <a:endParaRPr lang="en-US" dirty="0"/>
+          </a:p>
+        </p:txBody>
+      </p:sp>
+    </p:spTree>
+    <p:extLst>
+      <p:ext uri="{BB962C8B-B14F-4D97-AF65-F5344CB8AC3E}">
+        <p14:creationId xmlns:p14="http://schemas.microsoft.com/office/powerpoint/2010/main" val="200298026"/>
+      </p:ext>
+    </p:extLst>
+  </p:cSld>
+  <p:clrMapOvr>
+    <a:masterClrMapping/>
+  </p:clrMapOvr>
+</p:sld>
+</file>
+
+<file path=ppt/slides/slide9.xml><?xml version="1.0" encoding="utf-8"?>
+<p:sld xmlns:a="http://schemas.openxmlformats.org/drawingml/2006/main" xmlns:r="http://schemas.openxmlformats.org/officeDocument/2006/relationships" xmlns:p="http://schemas.openxmlformats.org/presentationml/2006/main">
+  <p:cSld>
+    <p:spTree>
+      <p:nvGrpSpPr>
+        <p:cNvPr id="1" name=""/>
+        <p:cNvGrpSpPr/>
+        <p:nvPr/>
+      </p:nvGrpSpPr>
+      <p:grpSpPr>
+        <a:xfrm>
+          <a:off x="0" y="0"/>
+          <a:ext cx="0" cy="0"/>
+          <a:chOff x="0" y="0"/>
+          <a:chExt cx="0" cy="0"/>
+        </a:xfrm>
+      </p:grpSpPr>
+      <p:sp>
+        <p:nvSpPr>
+          <p:cNvPr id="2" name="Title 1"/>
+          <p:cNvSpPr>
+            <a:spLocks noGrp="1"/>
+          </p:cNvSpPr>
+          <p:nvPr>
+            <p:ph type="title"/>
+          </p:nvPr>
+        </p:nvSpPr>
+        <p:spPr/>
+        <p:txBody>
+          <a:bodyPr/>
+          <a:lstStyle/>
+          <a:p>
+            <a:r>
+              <a:rPr lang="en-US" dirty="0" smtClean="0"/>
               <a:t>Simple Cassandra setup with </a:t>
             </a:r>
             <a:r>
@@ -6321,199 +6630,6 @@
   <p:clrMapOvr>
     <a:masterClrMapping/>
   </p:clrMapOvr>
-</p:sld>
-</file>
-
-<file path=ppt/slides/slide9.xml><?xml version="1.0" encoding="utf-8"?>
-<p:sld xmlns:a="http://schemas.openxmlformats.org/drawingml/2006/main" xmlns:r="http://schemas.openxmlformats.org/officeDocument/2006/relationships" xmlns:p="http://schemas.openxmlformats.org/presentationml/2006/main">
-  <p:cSld>
-    <p:spTree>
-      <p:nvGrpSpPr>
-        <p:cNvPr id="1" name=""/>
-        <p:cNvGrpSpPr/>
-        <p:nvPr/>
-      </p:nvGrpSpPr>
-      <p:grpSpPr>
-        <a:xfrm>
-          <a:off x="0" y="0"/>
-          <a:ext cx="0" cy="0"/>
-          <a:chOff x="0" y="0"/>
-          <a:chExt cx="0" cy="0"/>
-        </a:xfrm>
-      </p:grpSpPr>
-      <p:sp>
-        <p:nvSpPr>
-          <p:cNvPr id="2" name="Title 1"/>
-          <p:cNvSpPr>
-            <a:spLocks noGrp="1"/>
-          </p:cNvSpPr>
-          <p:nvPr>
-            <p:ph type="title"/>
-          </p:nvPr>
-        </p:nvSpPr>
-        <p:spPr/>
-        <p:txBody>
-          <a:bodyPr/>
-          <a:lstStyle/>
-          <a:p>
-            <a:r>
-              <a:rPr lang="en-US" dirty="0" smtClean="0"/>
-              <a:t>CQL: Like SQL but different</a:t>
-            </a:r>
-            <a:endParaRPr lang="en-US" dirty="0"/>
-          </a:p>
-        </p:txBody>
-      </p:sp>
-      <p:sp>
-        <p:nvSpPr>
-          <p:cNvPr id="3" name="Content Placeholder 2"/>
-          <p:cNvSpPr>
-            <a:spLocks noGrp="1"/>
-          </p:cNvSpPr>
-          <p:nvPr>
-            <p:ph idx="1"/>
-          </p:nvPr>
-        </p:nvSpPr>
-        <p:spPr/>
-        <p:txBody>
-          <a:bodyPr/>
-          <a:lstStyle/>
-          <a:p>
-            <a:r>
-              <a:rPr lang="en-US" dirty="0" smtClean="0"/>
-              <a:t>Originally when Cassandra made its debut, the only way to get at the data was to use Thrift calls that pulled and updated columns very much like working with a hash set.</a:t>
-            </a:r>
-          </a:p>
-          <a:p>
-            <a:r>
-              <a:rPr lang="en-US" dirty="0" smtClean="0"/>
-              <a:t>Cassandra then developed CQL (Cassandra Query Language) which is a familiar cousin of SQL with the following notable exceptions:</a:t>
-            </a:r>
-          </a:p>
-          <a:p>
-            <a:pPr>
-              <a:buFont typeface="Wingdings" panose="05000000000000000000" pitchFamily="2" charset="2"/>
-              <a:buChar char="q"/>
-            </a:pPr>
-            <a:r>
-              <a:rPr lang="en-US" dirty="0" smtClean="0"/>
-              <a:t>No joins. No GROUP BY. Data in Cassandra is expected to be mostly </a:t>
-            </a:r>
-            <a:r>
-              <a:rPr lang="en-US" dirty="0" err="1" smtClean="0"/>
-              <a:t>denormalized</a:t>
-            </a:r>
-            <a:r>
-              <a:rPr lang="en-US" dirty="0" smtClean="0"/>
-              <a:t>. Cassandra writes are extremely fast, faster than reads, which mitigates the extra write penalty.</a:t>
-            </a:r>
-          </a:p>
-          <a:p>
-            <a:pPr>
-              <a:buFont typeface="Wingdings" panose="05000000000000000000" pitchFamily="2" charset="2"/>
-              <a:buChar char="q"/>
-            </a:pPr>
-            <a:r>
-              <a:rPr lang="en-US" dirty="0" smtClean="0"/>
-              <a:t>Cassandra supports compound keys and data that has the data grouped together by the partition key (</a:t>
-            </a:r>
-            <a:r>
-              <a:rPr lang="en-US" b="1" dirty="0" smtClean="0"/>
-              <a:t>important! </a:t>
-            </a:r>
-            <a:r>
-              <a:rPr lang="en-US" dirty="0" smtClean="0"/>
-              <a:t>more on this later)</a:t>
-            </a:r>
-          </a:p>
-          <a:p>
-            <a:pPr>
-              <a:buFont typeface="Wingdings" panose="05000000000000000000" pitchFamily="2" charset="2"/>
-              <a:buChar char="q"/>
-            </a:pPr>
-            <a:r>
-              <a:rPr lang="en-US" dirty="0" smtClean="0"/>
-              <a:t>You can not use a WHERE clause to filter on columns that aren’t part of the row key or a secondary index.  Partition keys must be queried using the = operator or IN statements.</a:t>
-            </a:r>
-          </a:p>
-          <a:p>
-            <a:pPr>
-              <a:buFont typeface="Wingdings" panose="05000000000000000000" pitchFamily="2" charset="2"/>
-              <a:buChar char="q"/>
-            </a:pPr>
-            <a:r>
-              <a:rPr lang="en-US" dirty="0" smtClean="0"/>
-              <a:t>These rules and features keep you from shooting yourself in the foot.</a:t>
-            </a:r>
-            <a:endParaRPr lang="en-US" dirty="0"/>
-          </a:p>
-        </p:txBody>
-      </p:sp>
-      <p:pic>
-        <p:nvPicPr>
-          <p:cNvPr id="4" name="Picture 2" descr="http://planetcassandra.org/blogs/Upload/Post567/IW_R.png"/>
-          <p:cNvPicPr>
-            <a:picLocks noChangeAspect="1" noChangeArrowheads="1"/>
-          </p:cNvPicPr>
-          <p:nvPr/>
-        </p:nvPicPr>
-        <p:blipFill>
-          <a:blip r:embed="rId2">
-            <a:extLst>
-              <a:ext uri="{28A0092B-C50C-407E-A947-70E740481C1C}">
-                <a14:useLocalDpi xmlns:a14="http://schemas.microsoft.com/office/drawing/2010/main" val="0"/>
-              </a:ext>
-            </a:extLst>
-          </a:blip>
-          <a:srcRect/>
-          <a:stretch>
-            <a:fillRect/>
-          </a:stretch>
-        </p:blipFill>
-        <p:spPr bwMode="auto">
-          <a:xfrm>
-            <a:off x="10782554" y="0"/>
-            <a:ext cx="1409446" cy="1074426"/>
-          </a:xfrm>
-          <a:prstGeom prst="rect">
-            <a:avLst/>
-          </a:prstGeom>
-          <a:noFill/>
-          <a:effectLst>
-            <a:outerShdw blurRad="50800" dist="38100" algn="l" rotWithShape="0">
-              <a:prstClr val="black">
-                <a:alpha val="40000"/>
-              </a:prstClr>
-            </a:outerShdw>
-          </a:effectLst>
-          <a:extLst>
-            <a:ext uri="{909E8E84-426E-40DD-AFC4-6F175D3DCCD1}">
-              <a14:hiddenFill xmlns:a14="http://schemas.microsoft.com/office/drawing/2010/main">
-                <a:solidFill>
-                  <a:srgbClr val="FFFFFF"/>
-                </a:solidFill>
-              </a14:hiddenFill>
-            </a:ext>
-          </a:extLst>
-        </p:spPr>
-      </p:pic>
-    </p:spTree>
-    <p:extLst>
-      <p:ext uri="{BB962C8B-B14F-4D97-AF65-F5344CB8AC3E}">
-        <p14:creationId xmlns:p14="http://schemas.microsoft.com/office/powerpoint/2010/main" val="2598162185"/>
-      </p:ext>
-    </p:extLst>
-  </p:cSld>
-  <p:clrMapOvr>
-    <a:masterClrMapping/>
-  </p:clrMapOvr>
-  <p:timing>
-    <p:tnLst>
-      <p:par>
-        <p:cTn id="1" dur="indefinite" restart="never" nodeType="tmRoot"/>
-      </p:par>
-    </p:tnLst>
-  </p:timing>
 </p:sld>
 </file>
 

</xml_diff>